<commit_message>
fix typo in slide
- manifext > manifest
</commit_message>
<xml_diff>
--- a/OfficeAddin/04 Building Add-ins for Microsoft Outlook/02 Add-in Commands and Dialogs.pptx
+++ b/OfficeAddin/04 Building Add-ins for Microsoft Outlook/02 Add-in Commands and Dialogs.pptx
@@ -265,7 +265,7 @@
               <a:rPr lang="en-US" smtClean="0">
                 <a:latin typeface="Segoe UI" pitchFamily="34" charset="0"/>
               </a:rPr>
-              <a:t>12/18/18 11:25 AM</a:t>
+              <a:t>1/8/19 5:24 PM</a:t>
             </a:fld>
             <a:endParaRPr lang="en-US" dirty="0">
               <a:latin typeface="Segoe UI" pitchFamily="34" charset="0"/>
@@ -559,7 +559,7 @@
           <a:p>
             <a:fld id="{D18B56EA-E28F-4F92-9F16-7A6F2501B303}" type="datetime8">
               <a:rPr lang="en-US" smtClean="0"/>
-              <a:t>12/18/18 11:24 AM</a:t>
+              <a:t>1/8/19 5:24 PM</a:t>
             </a:fld>
             <a:endParaRPr lang="en-US" dirty="0"/>
           </a:p>
@@ -1047,7 +1047,7 @@
                 <a:tabLst/>
                 <a:defRPr/>
               </a:pPr>
-              <a:t>12/18/18 11:24 AM</a:t>
+              <a:t>1/8/19 5:24 PM</a:t>
             </a:fld>
             <a:endParaRPr kumimoji="0" lang="en-US" sz="1200" b="0" i="0" u="none" strike="noStrike" kern="1200" cap="none" spc="0" normalizeH="0" baseline="0" noProof="0" dirty="0">
               <a:ln>
@@ -1300,7 +1300,7 @@
           <a:p>
             <a:fld id="{D18B56EA-E28F-4F92-9F16-7A6F2501B303}" type="datetime8">
               <a:rPr lang="en-US" smtClean="0"/>
-              <a:t>12/18/18 11:25 AM</a:t>
+              <a:t>1/8/19 5:24 PM</a:t>
             </a:fld>
             <a:endParaRPr lang="en-US" dirty="0"/>
           </a:p>
@@ -1481,7 +1481,7 @@
           <a:p>
             <a:fld id="{D18B56EA-E28F-4F92-9F16-7A6F2501B303}" type="datetime8">
               <a:rPr lang="en-US" smtClean="0"/>
-              <a:t>12/18/18 2:23 PM</a:t>
+              <a:t>1/8/19 5:24 PM</a:t>
             </a:fld>
             <a:endParaRPr lang="en-US" dirty="0"/>
           </a:p>
@@ -1662,7 +1662,7 @@
           <a:p>
             <a:fld id="{D18B56EA-E28F-4F92-9F16-7A6F2501B303}" type="datetime8">
               <a:rPr lang="en-US" smtClean="0"/>
-              <a:t>12/18/18 11:25 AM</a:t>
+              <a:t>1/8/19 5:24 PM</a:t>
             </a:fld>
             <a:endParaRPr lang="en-US" dirty="0"/>
           </a:p>
@@ -1843,7 +1843,7 @@
           <a:p>
             <a:fld id="{D18B56EA-E28F-4F92-9F16-7A6F2501B303}" type="datetime8">
               <a:rPr lang="en-US" smtClean="0"/>
-              <a:t>12/18/18 11:25 AM</a:t>
+              <a:t>1/8/19 5:24 PM</a:t>
             </a:fld>
             <a:endParaRPr lang="en-US" dirty="0"/>
           </a:p>
@@ -2129,7 +2129,7 @@
                 <a:tabLst/>
                 <a:defRPr/>
               </a:pPr>
-              <a:t>12/18/18 11:25 AM</a:t>
+              <a:t>1/8/19 5:24 PM</a:t>
             </a:fld>
             <a:endParaRPr kumimoji="0" lang="en-US" sz="1200" b="0" i="0" u="none" strike="noStrike" kern="1200" cap="none" spc="0" normalizeH="0" baseline="0" noProof="0" dirty="0">
               <a:ln>
@@ -2794,7 +2794,7 @@
                 <a:tabLst/>
                 <a:defRPr/>
               </a:pPr>
-              <a:t>12/18/18 11:25 AM</a:t>
+              <a:t>1/8/19 5:24 PM</a:t>
             </a:fld>
             <a:endParaRPr kumimoji="0" lang="en-US" sz="1200" b="0" i="0" u="none" strike="noStrike" kern="1200" cap="none" spc="0" normalizeH="0" baseline="0" noProof="0" dirty="0">
               <a:ln>
@@ -3130,7 +3130,7 @@
           <a:p>
             <a:fld id="{D18B56EA-E28F-4F92-9F16-7A6F2501B303}" type="datetime8">
               <a:rPr lang="en-US" smtClean="0"/>
-              <a:t>12/18/18 11:25 AM</a:t>
+              <a:t>1/8/19 5:24 PM</a:t>
             </a:fld>
             <a:endParaRPr lang="en-US" dirty="0"/>
           </a:p>
@@ -3380,7 +3380,7 @@
           <a:p>
             <a:fld id="{D18B56EA-E28F-4F92-9F16-7A6F2501B303}" type="datetime8">
               <a:rPr lang="en-US" smtClean="0"/>
-              <a:t>12/18/18 11:25 AM</a:t>
+              <a:t>1/8/19 5:24 PM</a:t>
             </a:fld>
             <a:endParaRPr lang="en-US" dirty="0"/>
           </a:p>
@@ -3669,7 +3669,7 @@
           <a:p>
             <a:fld id="{D18B56EA-E28F-4F92-9F16-7A6F2501B303}" type="datetime8">
               <a:rPr lang="en-US" smtClean="0"/>
-              <a:t>12/18/18 11:25 AM</a:t>
+              <a:t>1/8/19 5:24 PM</a:t>
             </a:fld>
             <a:endParaRPr lang="en-US" dirty="0"/>
           </a:p>
@@ -3933,7 +3933,7 @@
           <a:p>
             <a:fld id="{D18B56EA-E28F-4F92-9F16-7A6F2501B303}" type="datetime8">
               <a:rPr lang="en-US" smtClean="0"/>
-              <a:t>12/18/18 11:25 AM</a:t>
+              <a:t>1/8/19 5:24 PM</a:t>
             </a:fld>
             <a:endParaRPr lang="en-US" dirty="0"/>
           </a:p>
@@ -4343,7 +4343,7 @@
           <a:p>
             <a:fld id="{D18B56EA-E28F-4F92-9F16-7A6F2501B303}" type="datetime8">
               <a:rPr lang="en-US" smtClean="0"/>
-              <a:t>12/18/18 11:25 AM</a:t>
+              <a:t>1/8/19 5:24 PM</a:t>
             </a:fld>
             <a:endParaRPr lang="en-US" dirty="0"/>
           </a:p>
@@ -4590,7 +4590,7 @@
           <a:p>
             <a:fld id="{D18B56EA-E28F-4F92-9F16-7A6F2501B303}" type="datetime8">
               <a:rPr lang="en-US" smtClean="0"/>
-              <a:t>12/18/18 11:25 AM</a:t>
+              <a:t>1/8/19 5:24 PM</a:t>
             </a:fld>
             <a:endParaRPr lang="en-US" dirty="0"/>
           </a:p>
@@ -24032,7 +24032,7 @@
         <p:spPr>
           <a:xfrm>
             <a:off x="266356" y="1055869"/>
-            <a:ext cx="1448538" cy="517065"/>
+            <a:ext cx="1507464" cy="517065"/>
           </a:xfrm>
           <a:prstGeom prst="rect">
             <a:avLst/>
@@ -24067,7 +24067,7 @@
                   <a:lin ang="5400000" scaled="0"/>
                 </a:gradFill>
               </a:rPr>
-              <a:t>manifext.xml</a:t>
+              <a:t>manifest.xml</a:t>
             </a:r>
             <a:endParaRPr lang="en-US" sz="1600" dirty="0">
               <a:gradFill>

</xml_diff>

<commit_message>
Office Addin M04 Outlook - Slide typo & screencast (#571)
</commit_message>
<xml_diff>
--- a/OfficeAddin/04 Building Add-ins for Microsoft Outlook/02 Add-in Commands and Dialogs.pptx
+++ b/OfficeAddin/04 Building Add-ins for Microsoft Outlook/02 Add-in Commands and Dialogs.pptx
@@ -265,7 +265,7 @@
               <a:rPr lang="en-US" smtClean="0">
                 <a:latin typeface="Segoe UI" pitchFamily="34" charset="0"/>
               </a:rPr>
-              <a:t>12/18/18 11:25 AM</a:t>
+              <a:t>1/8/19 5:24 PM</a:t>
             </a:fld>
             <a:endParaRPr lang="en-US" dirty="0">
               <a:latin typeface="Segoe UI" pitchFamily="34" charset="0"/>
@@ -559,7 +559,7 @@
           <a:p>
             <a:fld id="{D18B56EA-E28F-4F92-9F16-7A6F2501B303}" type="datetime8">
               <a:rPr lang="en-US" smtClean="0"/>
-              <a:t>12/18/18 11:24 AM</a:t>
+              <a:t>1/8/19 5:24 PM</a:t>
             </a:fld>
             <a:endParaRPr lang="en-US" dirty="0"/>
           </a:p>
@@ -1047,7 +1047,7 @@
                 <a:tabLst/>
                 <a:defRPr/>
               </a:pPr>
-              <a:t>12/18/18 11:24 AM</a:t>
+              <a:t>1/8/19 5:24 PM</a:t>
             </a:fld>
             <a:endParaRPr kumimoji="0" lang="en-US" sz="1200" b="0" i="0" u="none" strike="noStrike" kern="1200" cap="none" spc="0" normalizeH="0" baseline="0" noProof="0" dirty="0">
               <a:ln>
@@ -1300,7 +1300,7 @@
           <a:p>
             <a:fld id="{D18B56EA-E28F-4F92-9F16-7A6F2501B303}" type="datetime8">
               <a:rPr lang="en-US" smtClean="0"/>
-              <a:t>12/18/18 11:25 AM</a:t>
+              <a:t>1/8/19 5:24 PM</a:t>
             </a:fld>
             <a:endParaRPr lang="en-US" dirty="0"/>
           </a:p>
@@ -1481,7 +1481,7 @@
           <a:p>
             <a:fld id="{D18B56EA-E28F-4F92-9F16-7A6F2501B303}" type="datetime8">
               <a:rPr lang="en-US" smtClean="0"/>
-              <a:t>12/18/18 2:23 PM</a:t>
+              <a:t>1/8/19 5:24 PM</a:t>
             </a:fld>
             <a:endParaRPr lang="en-US" dirty="0"/>
           </a:p>
@@ -1662,7 +1662,7 @@
           <a:p>
             <a:fld id="{D18B56EA-E28F-4F92-9F16-7A6F2501B303}" type="datetime8">
               <a:rPr lang="en-US" smtClean="0"/>
-              <a:t>12/18/18 11:25 AM</a:t>
+              <a:t>1/8/19 5:24 PM</a:t>
             </a:fld>
             <a:endParaRPr lang="en-US" dirty="0"/>
           </a:p>
@@ -1843,7 +1843,7 @@
           <a:p>
             <a:fld id="{D18B56EA-E28F-4F92-9F16-7A6F2501B303}" type="datetime8">
               <a:rPr lang="en-US" smtClean="0"/>
-              <a:t>12/18/18 11:25 AM</a:t>
+              <a:t>1/8/19 5:24 PM</a:t>
             </a:fld>
             <a:endParaRPr lang="en-US" dirty="0"/>
           </a:p>
@@ -2129,7 +2129,7 @@
                 <a:tabLst/>
                 <a:defRPr/>
               </a:pPr>
-              <a:t>12/18/18 11:25 AM</a:t>
+              <a:t>1/8/19 5:24 PM</a:t>
             </a:fld>
             <a:endParaRPr kumimoji="0" lang="en-US" sz="1200" b="0" i="0" u="none" strike="noStrike" kern="1200" cap="none" spc="0" normalizeH="0" baseline="0" noProof="0" dirty="0">
               <a:ln>
@@ -2794,7 +2794,7 @@
                 <a:tabLst/>
                 <a:defRPr/>
               </a:pPr>
-              <a:t>12/18/18 11:25 AM</a:t>
+              <a:t>1/8/19 5:24 PM</a:t>
             </a:fld>
             <a:endParaRPr kumimoji="0" lang="en-US" sz="1200" b="0" i="0" u="none" strike="noStrike" kern="1200" cap="none" spc="0" normalizeH="0" baseline="0" noProof="0" dirty="0">
               <a:ln>
@@ -3130,7 +3130,7 @@
           <a:p>
             <a:fld id="{D18B56EA-E28F-4F92-9F16-7A6F2501B303}" type="datetime8">
               <a:rPr lang="en-US" smtClean="0"/>
-              <a:t>12/18/18 11:25 AM</a:t>
+              <a:t>1/8/19 5:24 PM</a:t>
             </a:fld>
             <a:endParaRPr lang="en-US" dirty="0"/>
           </a:p>
@@ -3380,7 +3380,7 @@
           <a:p>
             <a:fld id="{D18B56EA-E28F-4F92-9F16-7A6F2501B303}" type="datetime8">
               <a:rPr lang="en-US" smtClean="0"/>
-              <a:t>12/18/18 11:25 AM</a:t>
+              <a:t>1/8/19 5:24 PM</a:t>
             </a:fld>
             <a:endParaRPr lang="en-US" dirty="0"/>
           </a:p>
@@ -3669,7 +3669,7 @@
           <a:p>
             <a:fld id="{D18B56EA-E28F-4F92-9F16-7A6F2501B303}" type="datetime8">
               <a:rPr lang="en-US" smtClean="0"/>
-              <a:t>12/18/18 11:25 AM</a:t>
+              <a:t>1/8/19 5:24 PM</a:t>
             </a:fld>
             <a:endParaRPr lang="en-US" dirty="0"/>
           </a:p>
@@ -3933,7 +3933,7 @@
           <a:p>
             <a:fld id="{D18B56EA-E28F-4F92-9F16-7A6F2501B303}" type="datetime8">
               <a:rPr lang="en-US" smtClean="0"/>
-              <a:t>12/18/18 11:25 AM</a:t>
+              <a:t>1/8/19 5:24 PM</a:t>
             </a:fld>
             <a:endParaRPr lang="en-US" dirty="0"/>
           </a:p>
@@ -4343,7 +4343,7 @@
           <a:p>
             <a:fld id="{D18B56EA-E28F-4F92-9F16-7A6F2501B303}" type="datetime8">
               <a:rPr lang="en-US" smtClean="0"/>
-              <a:t>12/18/18 11:25 AM</a:t>
+              <a:t>1/8/19 5:24 PM</a:t>
             </a:fld>
             <a:endParaRPr lang="en-US" dirty="0"/>
           </a:p>
@@ -4590,7 +4590,7 @@
           <a:p>
             <a:fld id="{D18B56EA-E28F-4F92-9F16-7A6F2501B303}" type="datetime8">
               <a:rPr lang="en-US" smtClean="0"/>
-              <a:t>12/18/18 11:25 AM</a:t>
+              <a:t>1/8/19 5:24 PM</a:t>
             </a:fld>
             <a:endParaRPr lang="en-US" dirty="0"/>
           </a:p>
@@ -24032,7 +24032,7 @@
         <p:spPr>
           <a:xfrm>
             <a:off x="266356" y="1055869"/>
-            <a:ext cx="1448538" cy="517065"/>
+            <a:ext cx="1507464" cy="517065"/>
           </a:xfrm>
           <a:prstGeom prst="rect">
             <a:avLst/>
@@ -24067,7 +24067,7 @@
                   <a:lin ang="5400000" scaled="0"/>
                 </a:gradFill>
               </a:rPr>
-              <a:t>manifext.xml</a:t>
+              <a:t>manifest.xml</a:t>
             </a:r>
             <a:endParaRPr lang="en-US" sz="1600" dirty="0">
               <a:gradFill>

</xml_diff>

<commit_message>
officeaddins m4 - fy19q3 quarterly refresh
- added copyright to edited files
- updated slides & code samples to work against all current deps
</commit_message>
<xml_diff>
--- a/OfficeAddin/04 Building Add-ins for Microsoft Outlook/02 Add-in Commands and Dialogs.pptx
+++ b/OfficeAddin/04 Building Add-ins for Microsoft Outlook/02 Add-in Commands and Dialogs.pptx
@@ -265,7 +265,7 @@
               <a:rPr lang="en-US" smtClean="0">
                 <a:latin typeface="Segoe UI" pitchFamily="34" charset="0"/>
               </a:rPr>
-              <a:t>1/8/19 5:24 PM</a:t>
+              <a:t>3/4/19 8:30 PM</a:t>
             </a:fld>
             <a:endParaRPr lang="en-US" dirty="0">
               <a:latin typeface="Segoe UI" pitchFamily="34" charset="0"/>
@@ -559,7 +559,7 @@
           <a:p>
             <a:fld id="{D18B56EA-E28F-4F92-9F16-7A6F2501B303}" type="datetime8">
               <a:rPr lang="en-US" smtClean="0"/>
-              <a:t>1/8/19 5:24 PM</a:t>
+              <a:t>3/4/19 8:30 PM</a:t>
             </a:fld>
             <a:endParaRPr lang="en-US" dirty="0"/>
           </a:p>
@@ -1047,7 +1047,7 @@
                 <a:tabLst/>
                 <a:defRPr/>
               </a:pPr>
-              <a:t>1/8/19 5:24 PM</a:t>
+              <a:t>3/4/19 8:30 PM</a:t>
             </a:fld>
             <a:endParaRPr kumimoji="0" lang="en-US" sz="1200" b="0" i="0" u="none" strike="noStrike" kern="1200" cap="none" spc="0" normalizeH="0" baseline="0" noProof="0" dirty="0">
               <a:ln>
@@ -1300,7 +1300,7 @@
           <a:p>
             <a:fld id="{D18B56EA-E28F-4F92-9F16-7A6F2501B303}" type="datetime8">
               <a:rPr lang="en-US" smtClean="0"/>
-              <a:t>1/8/19 5:24 PM</a:t>
+              <a:t>3/4/19 8:30 PM</a:t>
             </a:fld>
             <a:endParaRPr lang="en-US" dirty="0"/>
           </a:p>
@@ -1481,7 +1481,7 @@
           <a:p>
             <a:fld id="{D18B56EA-E28F-4F92-9F16-7A6F2501B303}" type="datetime8">
               <a:rPr lang="en-US" smtClean="0"/>
-              <a:t>1/8/19 5:24 PM</a:t>
+              <a:t>3/4/19 8:30 PM</a:t>
             </a:fld>
             <a:endParaRPr lang="en-US" dirty="0"/>
           </a:p>
@@ -1662,7 +1662,7 @@
           <a:p>
             <a:fld id="{D18B56EA-E28F-4F92-9F16-7A6F2501B303}" type="datetime8">
               <a:rPr lang="en-US" smtClean="0"/>
-              <a:t>1/8/19 5:24 PM</a:t>
+              <a:t>3/4/19 8:30 PM</a:t>
             </a:fld>
             <a:endParaRPr lang="en-US" dirty="0"/>
           </a:p>
@@ -1843,7 +1843,7 @@
           <a:p>
             <a:fld id="{D18B56EA-E28F-4F92-9F16-7A6F2501B303}" type="datetime8">
               <a:rPr lang="en-US" smtClean="0"/>
-              <a:t>1/8/19 5:24 PM</a:t>
+              <a:t>3/4/19 8:30 PM</a:t>
             </a:fld>
             <a:endParaRPr lang="en-US" dirty="0"/>
           </a:p>
@@ -2129,7 +2129,7 @@
                 <a:tabLst/>
                 <a:defRPr/>
               </a:pPr>
-              <a:t>1/8/19 5:24 PM</a:t>
+              <a:t>3/4/19 8:30 PM</a:t>
             </a:fld>
             <a:endParaRPr kumimoji="0" lang="en-US" sz="1200" b="0" i="0" u="none" strike="noStrike" kern="1200" cap="none" spc="0" normalizeH="0" baseline="0" noProof="0" dirty="0">
               <a:ln>
@@ -2794,7 +2794,7 @@
                 <a:tabLst/>
                 <a:defRPr/>
               </a:pPr>
-              <a:t>1/8/19 5:24 PM</a:t>
+              <a:t>3/4/19 8:30 PM</a:t>
             </a:fld>
             <a:endParaRPr kumimoji="0" lang="en-US" sz="1200" b="0" i="0" u="none" strike="noStrike" kern="1200" cap="none" spc="0" normalizeH="0" baseline="0" noProof="0" dirty="0">
               <a:ln>
@@ -3130,7 +3130,7 @@
           <a:p>
             <a:fld id="{D18B56EA-E28F-4F92-9F16-7A6F2501B303}" type="datetime8">
               <a:rPr lang="en-US" smtClean="0"/>
-              <a:t>1/8/19 5:24 PM</a:t>
+              <a:t>3/4/19 8:30 PM</a:t>
             </a:fld>
             <a:endParaRPr lang="en-US" dirty="0"/>
           </a:p>
@@ -3380,7 +3380,7 @@
           <a:p>
             <a:fld id="{D18B56EA-E28F-4F92-9F16-7A6F2501B303}" type="datetime8">
               <a:rPr lang="en-US" smtClean="0"/>
-              <a:t>1/8/19 5:24 PM</a:t>
+              <a:t>3/4/19 8:30 PM</a:t>
             </a:fld>
             <a:endParaRPr lang="en-US" dirty="0"/>
           </a:p>
@@ -3669,7 +3669,7 @@
           <a:p>
             <a:fld id="{D18B56EA-E28F-4F92-9F16-7A6F2501B303}" type="datetime8">
               <a:rPr lang="en-US" smtClean="0"/>
-              <a:t>1/8/19 5:24 PM</a:t>
+              <a:t>3/4/19 8:30 PM</a:t>
             </a:fld>
             <a:endParaRPr lang="en-US" dirty="0"/>
           </a:p>
@@ -3933,7 +3933,7 @@
           <a:p>
             <a:fld id="{D18B56EA-E28F-4F92-9F16-7A6F2501B303}" type="datetime8">
               <a:rPr lang="en-US" smtClean="0"/>
-              <a:t>1/8/19 5:24 PM</a:t>
+              <a:t>3/4/19 8:30 PM</a:t>
             </a:fld>
             <a:endParaRPr lang="en-US" dirty="0"/>
           </a:p>
@@ -4343,7 +4343,7 @@
           <a:p>
             <a:fld id="{D18B56EA-E28F-4F92-9F16-7A6F2501B303}" type="datetime8">
               <a:rPr lang="en-US" smtClean="0"/>
-              <a:t>1/8/19 5:24 PM</a:t>
+              <a:t>3/4/19 8:30 PM</a:t>
             </a:fld>
             <a:endParaRPr lang="en-US" dirty="0"/>
           </a:p>
@@ -4590,7 +4590,7 @@
           <a:p>
             <a:fld id="{D18B56EA-E28F-4F92-9F16-7A6F2501B303}" type="datetime8">
               <a:rPr lang="en-US" smtClean="0"/>
-              <a:t>1/8/19 5:24 PM</a:t>
+              <a:t>3/4/19 8:30 PM</a:t>
             </a:fld>
             <a:endParaRPr lang="en-US" dirty="0"/>
           </a:p>

</xml_diff>

<commit_message>
OfficeAddins - Module 4: FY2019Q3 Quarterly refresh (#576)
* officeaddins m4 - fy19q3 quarterly refresh

- added copyright to edited files
- updated slides & code samples to work against all current deps

* address reviewer feedback

- fixed copyright comment location

* fix demo addin manifests
</commit_message>
<xml_diff>
--- a/OfficeAddin/04 Building Add-ins for Microsoft Outlook/02 Add-in Commands and Dialogs.pptx
+++ b/OfficeAddin/04 Building Add-ins for Microsoft Outlook/02 Add-in Commands and Dialogs.pptx
@@ -265,7 +265,7 @@
               <a:rPr lang="en-US" smtClean="0">
                 <a:latin typeface="Segoe UI" pitchFamily="34" charset="0"/>
               </a:rPr>
-              <a:t>1/8/19 5:24 PM</a:t>
+              <a:t>3/4/19 8:30 PM</a:t>
             </a:fld>
             <a:endParaRPr lang="en-US" dirty="0">
               <a:latin typeface="Segoe UI" pitchFamily="34" charset="0"/>
@@ -559,7 +559,7 @@
           <a:p>
             <a:fld id="{D18B56EA-E28F-4F92-9F16-7A6F2501B303}" type="datetime8">
               <a:rPr lang="en-US" smtClean="0"/>
-              <a:t>1/8/19 5:24 PM</a:t>
+              <a:t>3/4/19 8:30 PM</a:t>
             </a:fld>
             <a:endParaRPr lang="en-US" dirty="0"/>
           </a:p>
@@ -1047,7 +1047,7 @@
                 <a:tabLst/>
                 <a:defRPr/>
               </a:pPr>
-              <a:t>1/8/19 5:24 PM</a:t>
+              <a:t>3/4/19 8:30 PM</a:t>
             </a:fld>
             <a:endParaRPr kumimoji="0" lang="en-US" sz="1200" b="0" i="0" u="none" strike="noStrike" kern="1200" cap="none" spc="0" normalizeH="0" baseline="0" noProof="0" dirty="0">
               <a:ln>
@@ -1300,7 +1300,7 @@
           <a:p>
             <a:fld id="{D18B56EA-E28F-4F92-9F16-7A6F2501B303}" type="datetime8">
               <a:rPr lang="en-US" smtClean="0"/>
-              <a:t>1/8/19 5:24 PM</a:t>
+              <a:t>3/4/19 8:30 PM</a:t>
             </a:fld>
             <a:endParaRPr lang="en-US" dirty="0"/>
           </a:p>
@@ -1481,7 +1481,7 @@
           <a:p>
             <a:fld id="{D18B56EA-E28F-4F92-9F16-7A6F2501B303}" type="datetime8">
               <a:rPr lang="en-US" smtClean="0"/>
-              <a:t>1/8/19 5:24 PM</a:t>
+              <a:t>3/4/19 8:30 PM</a:t>
             </a:fld>
             <a:endParaRPr lang="en-US" dirty="0"/>
           </a:p>
@@ -1662,7 +1662,7 @@
           <a:p>
             <a:fld id="{D18B56EA-E28F-4F92-9F16-7A6F2501B303}" type="datetime8">
               <a:rPr lang="en-US" smtClean="0"/>
-              <a:t>1/8/19 5:24 PM</a:t>
+              <a:t>3/4/19 8:30 PM</a:t>
             </a:fld>
             <a:endParaRPr lang="en-US" dirty="0"/>
           </a:p>
@@ -1843,7 +1843,7 @@
           <a:p>
             <a:fld id="{D18B56EA-E28F-4F92-9F16-7A6F2501B303}" type="datetime8">
               <a:rPr lang="en-US" smtClean="0"/>
-              <a:t>1/8/19 5:24 PM</a:t>
+              <a:t>3/4/19 8:30 PM</a:t>
             </a:fld>
             <a:endParaRPr lang="en-US" dirty="0"/>
           </a:p>
@@ -2129,7 +2129,7 @@
                 <a:tabLst/>
                 <a:defRPr/>
               </a:pPr>
-              <a:t>1/8/19 5:24 PM</a:t>
+              <a:t>3/4/19 8:30 PM</a:t>
             </a:fld>
             <a:endParaRPr kumimoji="0" lang="en-US" sz="1200" b="0" i="0" u="none" strike="noStrike" kern="1200" cap="none" spc="0" normalizeH="0" baseline="0" noProof="0" dirty="0">
               <a:ln>
@@ -2794,7 +2794,7 @@
                 <a:tabLst/>
                 <a:defRPr/>
               </a:pPr>
-              <a:t>1/8/19 5:24 PM</a:t>
+              <a:t>3/4/19 8:30 PM</a:t>
             </a:fld>
             <a:endParaRPr kumimoji="0" lang="en-US" sz="1200" b="0" i="0" u="none" strike="noStrike" kern="1200" cap="none" spc="0" normalizeH="0" baseline="0" noProof="0" dirty="0">
               <a:ln>
@@ -3130,7 +3130,7 @@
           <a:p>
             <a:fld id="{D18B56EA-E28F-4F92-9F16-7A6F2501B303}" type="datetime8">
               <a:rPr lang="en-US" smtClean="0"/>
-              <a:t>1/8/19 5:24 PM</a:t>
+              <a:t>3/4/19 8:30 PM</a:t>
             </a:fld>
             <a:endParaRPr lang="en-US" dirty="0"/>
           </a:p>
@@ -3380,7 +3380,7 @@
           <a:p>
             <a:fld id="{D18B56EA-E28F-4F92-9F16-7A6F2501B303}" type="datetime8">
               <a:rPr lang="en-US" smtClean="0"/>
-              <a:t>1/8/19 5:24 PM</a:t>
+              <a:t>3/4/19 8:30 PM</a:t>
             </a:fld>
             <a:endParaRPr lang="en-US" dirty="0"/>
           </a:p>
@@ -3669,7 +3669,7 @@
           <a:p>
             <a:fld id="{D18B56EA-E28F-4F92-9F16-7A6F2501B303}" type="datetime8">
               <a:rPr lang="en-US" smtClean="0"/>
-              <a:t>1/8/19 5:24 PM</a:t>
+              <a:t>3/4/19 8:30 PM</a:t>
             </a:fld>
             <a:endParaRPr lang="en-US" dirty="0"/>
           </a:p>
@@ -3933,7 +3933,7 @@
           <a:p>
             <a:fld id="{D18B56EA-E28F-4F92-9F16-7A6F2501B303}" type="datetime8">
               <a:rPr lang="en-US" smtClean="0"/>
-              <a:t>1/8/19 5:24 PM</a:t>
+              <a:t>3/4/19 8:30 PM</a:t>
             </a:fld>
             <a:endParaRPr lang="en-US" dirty="0"/>
           </a:p>
@@ -4343,7 +4343,7 @@
           <a:p>
             <a:fld id="{D18B56EA-E28F-4F92-9F16-7A6F2501B303}" type="datetime8">
               <a:rPr lang="en-US" smtClean="0"/>
-              <a:t>1/8/19 5:24 PM</a:t>
+              <a:t>3/4/19 8:30 PM</a:t>
             </a:fld>
             <a:endParaRPr lang="en-US" dirty="0"/>
           </a:p>
@@ -4590,7 +4590,7 @@
           <a:p>
             <a:fld id="{D18B56EA-E28F-4F92-9F16-7A6F2501B303}" type="datetime8">
               <a:rPr lang="en-US" smtClean="0"/>
-              <a:t>1/8/19 5:24 PM</a:t>
+              <a:t>3/4/19 8:30 PM</a:t>
             </a:fld>
             <a:endParaRPr lang="en-US" dirty="0"/>
           </a:p>

</xml_diff>

<commit_message>
FY19Q4 content refresh (#591)
- updated to reflect new project structure from Yeoman generator
</commit_message>
<xml_diff>
--- a/OfficeAddin/04 Building Add-ins for Microsoft Outlook/02 Add-in Commands and Dialogs.pptx
+++ b/OfficeAddin/04 Building Add-ins for Microsoft Outlook/02 Add-in Commands and Dialogs.pptx
@@ -265,7 +265,7 @@
               <a:rPr lang="en-US" smtClean="0">
                 <a:latin typeface="Segoe UI" pitchFamily="34" charset="0"/>
               </a:rPr>
-              <a:t>3/4/19 8:30 PM</a:t>
+              <a:t>6/5/19 4:28 PM</a:t>
             </a:fld>
             <a:endParaRPr lang="en-US" dirty="0">
               <a:latin typeface="Segoe UI" pitchFamily="34" charset="0"/>
@@ -559,7 +559,7 @@
           <a:p>
             <a:fld id="{D18B56EA-E28F-4F92-9F16-7A6F2501B303}" type="datetime8">
               <a:rPr lang="en-US" smtClean="0"/>
-              <a:t>3/4/19 8:30 PM</a:t>
+              <a:t>6/5/19 4:28 PM</a:t>
             </a:fld>
             <a:endParaRPr lang="en-US" dirty="0"/>
           </a:p>
@@ -1047,7 +1047,7 @@
                 <a:tabLst/>
                 <a:defRPr/>
               </a:pPr>
-              <a:t>3/4/19 8:30 PM</a:t>
+              <a:t>6/5/19 4:28 PM</a:t>
             </a:fld>
             <a:endParaRPr kumimoji="0" lang="en-US" sz="1200" b="0" i="0" u="none" strike="noStrike" kern="1200" cap="none" spc="0" normalizeH="0" baseline="0" noProof="0" dirty="0">
               <a:ln>
@@ -1300,7 +1300,7 @@
           <a:p>
             <a:fld id="{D18B56EA-E28F-4F92-9F16-7A6F2501B303}" type="datetime8">
               <a:rPr lang="en-US" smtClean="0"/>
-              <a:t>3/4/19 8:30 PM</a:t>
+              <a:t>6/5/19 4:28 PM</a:t>
             </a:fld>
             <a:endParaRPr lang="en-US" dirty="0"/>
           </a:p>
@@ -1481,7 +1481,7 @@
           <a:p>
             <a:fld id="{D18B56EA-E28F-4F92-9F16-7A6F2501B303}" type="datetime8">
               <a:rPr lang="en-US" smtClean="0"/>
-              <a:t>3/4/19 8:30 PM</a:t>
+              <a:t>6/5/19 4:28 PM</a:t>
             </a:fld>
             <a:endParaRPr lang="en-US" dirty="0"/>
           </a:p>
@@ -1662,7 +1662,7 @@
           <a:p>
             <a:fld id="{D18B56EA-E28F-4F92-9F16-7A6F2501B303}" type="datetime8">
               <a:rPr lang="en-US" smtClean="0"/>
-              <a:t>3/4/19 8:30 PM</a:t>
+              <a:t>6/5/19 4:28 PM</a:t>
             </a:fld>
             <a:endParaRPr lang="en-US" dirty="0"/>
           </a:p>
@@ -1843,7 +1843,7 @@
           <a:p>
             <a:fld id="{D18B56EA-E28F-4F92-9F16-7A6F2501B303}" type="datetime8">
               <a:rPr lang="en-US" smtClean="0"/>
-              <a:t>3/4/19 8:30 PM</a:t>
+              <a:t>6/5/19 4:28 PM</a:t>
             </a:fld>
             <a:endParaRPr lang="en-US" dirty="0"/>
           </a:p>
@@ -2129,7 +2129,7 @@
                 <a:tabLst/>
                 <a:defRPr/>
               </a:pPr>
-              <a:t>3/4/19 8:30 PM</a:t>
+              <a:t>6/5/19 4:28 PM</a:t>
             </a:fld>
             <a:endParaRPr kumimoji="0" lang="en-US" sz="1200" b="0" i="0" u="none" strike="noStrike" kern="1200" cap="none" spc="0" normalizeH="0" baseline="0" noProof="0" dirty="0">
               <a:ln>
@@ -2794,7 +2794,7 @@
                 <a:tabLst/>
                 <a:defRPr/>
               </a:pPr>
-              <a:t>3/4/19 8:30 PM</a:t>
+              <a:t>6/5/19 4:28 PM</a:t>
             </a:fld>
             <a:endParaRPr kumimoji="0" lang="en-US" sz="1200" b="0" i="0" u="none" strike="noStrike" kern="1200" cap="none" spc="0" normalizeH="0" baseline="0" noProof="0" dirty="0">
               <a:ln>
@@ -3130,7 +3130,7 @@
           <a:p>
             <a:fld id="{D18B56EA-E28F-4F92-9F16-7A6F2501B303}" type="datetime8">
               <a:rPr lang="en-US" smtClean="0"/>
-              <a:t>3/4/19 8:30 PM</a:t>
+              <a:t>6/5/19 4:28 PM</a:t>
             </a:fld>
             <a:endParaRPr lang="en-US" dirty="0"/>
           </a:p>
@@ -3380,7 +3380,7 @@
           <a:p>
             <a:fld id="{D18B56EA-E28F-4F92-9F16-7A6F2501B303}" type="datetime8">
               <a:rPr lang="en-US" smtClean="0"/>
-              <a:t>3/4/19 8:30 PM</a:t>
+              <a:t>6/5/19 4:28 PM</a:t>
             </a:fld>
             <a:endParaRPr lang="en-US" dirty="0"/>
           </a:p>
@@ -3669,7 +3669,7 @@
           <a:p>
             <a:fld id="{D18B56EA-E28F-4F92-9F16-7A6F2501B303}" type="datetime8">
               <a:rPr lang="en-US" smtClean="0"/>
-              <a:t>3/4/19 8:30 PM</a:t>
+              <a:t>6/5/19 4:28 PM</a:t>
             </a:fld>
             <a:endParaRPr lang="en-US" dirty="0"/>
           </a:p>
@@ -3933,7 +3933,7 @@
           <a:p>
             <a:fld id="{D18B56EA-E28F-4F92-9F16-7A6F2501B303}" type="datetime8">
               <a:rPr lang="en-US" smtClean="0"/>
-              <a:t>3/4/19 8:30 PM</a:t>
+              <a:t>6/5/19 4:28 PM</a:t>
             </a:fld>
             <a:endParaRPr lang="en-US" dirty="0"/>
           </a:p>
@@ -4343,7 +4343,7 @@
           <a:p>
             <a:fld id="{D18B56EA-E28F-4F92-9F16-7A6F2501B303}" type="datetime8">
               <a:rPr lang="en-US" smtClean="0"/>
-              <a:t>3/4/19 8:30 PM</a:t>
+              <a:t>6/5/19 4:28 PM</a:t>
             </a:fld>
             <a:endParaRPr lang="en-US" dirty="0"/>
           </a:p>
@@ -4590,7 +4590,7 @@
           <a:p>
             <a:fld id="{D18B56EA-E28F-4F92-9F16-7A6F2501B303}" type="datetime8">
               <a:rPr lang="en-US" smtClean="0"/>
-              <a:t>3/4/19 8:30 PM</a:t>
+              <a:t>6/5/19 4:28 PM</a:t>
             </a:fld>
             <a:endParaRPr lang="en-US" dirty="0"/>
           </a:p>
@@ -14886,7 +14886,7 @@
       </a:lvl9pPr>
     </p:otherStyle>
   </p:txStyles>
-  <p:extLst mod="1">
+  <p:extLst>
     <p:ext uri="{27BBF7A9-308A-43DC-89C8-2F10F3537804}">
       <p15:sldGuideLst xmlns:p15="http://schemas.microsoft.com/office/powerpoint/2012/main">
         <p15:guide id="3" pos="1381" userDrawn="1">

</xml_diff>

<commit_message>
FY2020Q1 OfficeAddins M4 content refresh
</commit_message>
<xml_diff>
--- a/OfficeAddin/04 Building Add-ins for Microsoft Outlook/02 Add-in Commands and Dialogs.pptx
+++ b/OfficeAddin/04 Building Add-ins for Microsoft Outlook/02 Add-in Commands and Dialogs.pptx
@@ -265,7 +265,7 @@
               <a:rPr lang="en-US" smtClean="0">
                 <a:latin typeface="Segoe UI" pitchFamily="34" charset="0"/>
               </a:rPr>
-              <a:t>6/5/19 4:28 PM</a:t>
+              <a:t>9/8/19 8:28 PM</a:t>
             </a:fld>
             <a:endParaRPr lang="en-US" dirty="0">
               <a:latin typeface="Segoe UI" pitchFamily="34" charset="0"/>
@@ -559,7 +559,7 @@
           <a:p>
             <a:fld id="{D18B56EA-E28F-4F92-9F16-7A6F2501B303}" type="datetime8">
               <a:rPr lang="en-US" smtClean="0"/>
-              <a:t>6/5/19 4:28 PM</a:t>
+              <a:t>9/8/19 8:28 PM</a:t>
             </a:fld>
             <a:endParaRPr lang="en-US" dirty="0"/>
           </a:p>
@@ -1047,7 +1047,7 @@
                 <a:tabLst/>
                 <a:defRPr/>
               </a:pPr>
-              <a:t>6/5/19 4:28 PM</a:t>
+              <a:t>9/8/19 8:28 PM</a:t>
             </a:fld>
             <a:endParaRPr kumimoji="0" lang="en-US" sz="1200" b="0" i="0" u="none" strike="noStrike" kern="1200" cap="none" spc="0" normalizeH="0" baseline="0" noProof="0" dirty="0">
               <a:ln>
@@ -1300,7 +1300,7 @@
           <a:p>
             <a:fld id="{D18B56EA-E28F-4F92-9F16-7A6F2501B303}" type="datetime8">
               <a:rPr lang="en-US" smtClean="0"/>
-              <a:t>6/5/19 4:28 PM</a:t>
+              <a:t>9/8/19 8:28 PM</a:t>
             </a:fld>
             <a:endParaRPr lang="en-US" dirty="0"/>
           </a:p>
@@ -1481,7 +1481,7 @@
           <a:p>
             <a:fld id="{D18B56EA-E28F-4F92-9F16-7A6F2501B303}" type="datetime8">
               <a:rPr lang="en-US" smtClean="0"/>
-              <a:t>6/5/19 4:28 PM</a:t>
+              <a:t>9/8/19 8:28 PM</a:t>
             </a:fld>
             <a:endParaRPr lang="en-US" dirty="0"/>
           </a:p>
@@ -1662,7 +1662,7 @@
           <a:p>
             <a:fld id="{D18B56EA-E28F-4F92-9F16-7A6F2501B303}" type="datetime8">
               <a:rPr lang="en-US" smtClean="0"/>
-              <a:t>6/5/19 4:28 PM</a:t>
+              <a:t>9/8/19 8:28 PM</a:t>
             </a:fld>
             <a:endParaRPr lang="en-US" dirty="0"/>
           </a:p>
@@ -1843,7 +1843,7 @@
           <a:p>
             <a:fld id="{D18B56EA-E28F-4F92-9F16-7A6F2501B303}" type="datetime8">
               <a:rPr lang="en-US" smtClean="0"/>
-              <a:t>6/5/19 4:28 PM</a:t>
+              <a:t>9/8/19 8:28 PM</a:t>
             </a:fld>
             <a:endParaRPr lang="en-US" dirty="0"/>
           </a:p>
@@ -2129,7 +2129,7 @@
                 <a:tabLst/>
                 <a:defRPr/>
               </a:pPr>
-              <a:t>6/5/19 4:28 PM</a:t>
+              <a:t>9/8/19 8:28 PM</a:t>
             </a:fld>
             <a:endParaRPr kumimoji="0" lang="en-US" sz="1200" b="0" i="0" u="none" strike="noStrike" kern="1200" cap="none" spc="0" normalizeH="0" baseline="0" noProof="0" dirty="0">
               <a:ln>
@@ -2794,7 +2794,7 @@
                 <a:tabLst/>
                 <a:defRPr/>
               </a:pPr>
-              <a:t>6/5/19 4:28 PM</a:t>
+              <a:t>9/8/19 8:28 PM</a:t>
             </a:fld>
             <a:endParaRPr kumimoji="0" lang="en-US" sz="1200" b="0" i="0" u="none" strike="noStrike" kern="1200" cap="none" spc="0" normalizeH="0" baseline="0" noProof="0" dirty="0">
               <a:ln>
@@ -3130,7 +3130,7 @@
           <a:p>
             <a:fld id="{D18B56EA-E28F-4F92-9F16-7A6F2501B303}" type="datetime8">
               <a:rPr lang="en-US" smtClean="0"/>
-              <a:t>6/5/19 4:28 PM</a:t>
+              <a:t>9/8/19 8:28 PM</a:t>
             </a:fld>
             <a:endParaRPr lang="en-US" dirty="0"/>
           </a:p>
@@ -3380,7 +3380,7 @@
           <a:p>
             <a:fld id="{D18B56EA-E28F-4F92-9F16-7A6F2501B303}" type="datetime8">
               <a:rPr lang="en-US" smtClean="0"/>
-              <a:t>6/5/19 4:28 PM</a:t>
+              <a:t>9/8/19 8:28 PM</a:t>
             </a:fld>
             <a:endParaRPr lang="en-US" dirty="0"/>
           </a:p>
@@ -3669,7 +3669,7 @@
           <a:p>
             <a:fld id="{D18B56EA-E28F-4F92-9F16-7A6F2501B303}" type="datetime8">
               <a:rPr lang="en-US" smtClean="0"/>
-              <a:t>6/5/19 4:28 PM</a:t>
+              <a:t>9/8/19 8:28 PM</a:t>
             </a:fld>
             <a:endParaRPr lang="en-US" dirty="0"/>
           </a:p>
@@ -3933,7 +3933,7 @@
           <a:p>
             <a:fld id="{D18B56EA-E28F-4F92-9F16-7A6F2501B303}" type="datetime8">
               <a:rPr lang="en-US" smtClean="0"/>
-              <a:t>6/5/19 4:28 PM</a:t>
+              <a:t>9/8/19 8:28 PM</a:t>
             </a:fld>
             <a:endParaRPr lang="en-US" dirty="0"/>
           </a:p>
@@ -4343,7 +4343,7 @@
           <a:p>
             <a:fld id="{D18B56EA-E28F-4F92-9F16-7A6F2501B303}" type="datetime8">
               <a:rPr lang="en-US" smtClean="0"/>
-              <a:t>6/5/19 4:28 PM</a:t>
+              <a:t>9/8/19 8:28 PM</a:t>
             </a:fld>
             <a:endParaRPr lang="en-US" dirty="0"/>
           </a:p>
@@ -4590,7 +4590,7 @@
           <a:p>
             <a:fld id="{D18B56EA-E28F-4F92-9F16-7A6F2501B303}" type="datetime8">
               <a:rPr lang="en-US" smtClean="0"/>
-              <a:t>6/5/19 4:28 PM</a:t>
+              <a:t>9/8/19 8:28 PM</a:t>
             </a:fld>
             <a:endParaRPr lang="en-US" dirty="0"/>
           </a:p>

</xml_diff>

<commit_message>
FY2020Q1 OfficeAddins M4 content refresh (#620)
</commit_message>
<xml_diff>
--- a/OfficeAddin/04 Building Add-ins for Microsoft Outlook/02 Add-in Commands and Dialogs.pptx
+++ b/OfficeAddin/04 Building Add-ins for Microsoft Outlook/02 Add-in Commands and Dialogs.pptx
@@ -265,7 +265,7 @@
               <a:rPr lang="en-US" smtClean="0">
                 <a:latin typeface="Segoe UI" pitchFamily="34" charset="0"/>
               </a:rPr>
-              <a:t>6/5/19 4:28 PM</a:t>
+              <a:t>9/8/19 8:28 PM</a:t>
             </a:fld>
             <a:endParaRPr lang="en-US" dirty="0">
               <a:latin typeface="Segoe UI" pitchFamily="34" charset="0"/>
@@ -559,7 +559,7 @@
           <a:p>
             <a:fld id="{D18B56EA-E28F-4F92-9F16-7A6F2501B303}" type="datetime8">
               <a:rPr lang="en-US" smtClean="0"/>
-              <a:t>6/5/19 4:28 PM</a:t>
+              <a:t>9/8/19 8:28 PM</a:t>
             </a:fld>
             <a:endParaRPr lang="en-US" dirty="0"/>
           </a:p>
@@ -1047,7 +1047,7 @@
                 <a:tabLst/>
                 <a:defRPr/>
               </a:pPr>
-              <a:t>6/5/19 4:28 PM</a:t>
+              <a:t>9/8/19 8:28 PM</a:t>
             </a:fld>
             <a:endParaRPr kumimoji="0" lang="en-US" sz="1200" b="0" i="0" u="none" strike="noStrike" kern="1200" cap="none" spc="0" normalizeH="0" baseline="0" noProof="0" dirty="0">
               <a:ln>
@@ -1300,7 +1300,7 @@
           <a:p>
             <a:fld id="{D18B56EA-E28F-4F92-9F16-7A6F2501B303}" type="datetime8">
               <a:rPr lang="en-US" smtClean="0"/>
-              <a:t>6/5/19 4:28 PM</a:t>
+              <a:t>9/8/19 8:28 PM</a:t>
             </a:fld>
             <a:endParaRPr lang="en-US" dirty="0"/>
           </a:p>
@@ -1481,7 +1481,7 @@
           <a:p>
             <a:fld id="{D18B56EA-E28F-4F92-9F16-7A6F2501B303}" type="datetime8">
               <a:rPr lang="en-US" smtClean="0"/>
-              <a:t>6/5/19 4:28 PM</a:t>
+              <a:t>9/8/19 8:28 PM</a:t>
             </a:fld>
             <a:endParaRPr lang="en-US" dirty="0"/>
           </a:p>
@@ -1662,7 +1662,7 @@
           <a:p>
             <a:fld id="{D18B56EA-E28F-4F92-9F16-7A6F2501B303}" type="datetime8">
               <a:rPr lang="en-US" smtClean="0"/>
-              <a:t>6/5/19 4:28 PM</a:t>
+              <a:t>9/8/19 8:28 PM</a:t>
             </a:fld>
             <a:endParaRPr lang="en-US" dirty="0"/>
           </a:p>
@@ -1843,7 +1843,7 @@
           <a:p>
             <a:fld id="{D18B56EA-E28F-4F92-9F16-7A6F2501B303}" type="datetime8">
               <a:rPr lang="en-US" smtClean="0"/>
-              <a:t>6/5/19 4:28 PM</a:t>
+              <a:t>9/8/19 8:28 PM</a:t>
             </a:fld>
             <a:endParaRPr lang="en-US" dirty="0"/>
           </a:p>
@@ -2129,7 +2129,7 @@
                 <a:tabLst/>
                 <a:defRPr/>
               </a:pPr>
-              <a:t>6/5/19 4:28 PM</a:t>
+              <a:t>9/8/19 8:28 PM</a:t>
             </a:fld>
             <a:endParaRPr kumimoji="0" lang="en-US" sz="1200" b="0" i="0" u="none" strike="noStrike" kern="1200" cap="none" spc="0" normalizeH="0" baseline="0" noProof="0" dirty="0">
               <a:ln>
@@ -2794,7 +2794,7 @@
                 <a:tabLst/>
                 <a:defRPr/>
               </a:pPr>
-              <a:t>6/5/19 4:28 PM</a:t>
+              <a:t>9/8/19 8:28 PM</a:t>
             </a:fld>
             <a:endParaRPr kumimoji="0" lang="en-US" sz="1200" b="0" i="0" u="none" strike="noStrike" kern="1200" cap="none" spc="0" normalizeH="0" baseline="0" noProof="0" dirty="0">
               <a:ln>
@@ -3130,7 +3130,7 @@
           <a:p>
             <a:fld id="{D18B56EA-E28F-4F92-9F16-7A6F2501B303}" type="datetime8">
               <a:rPr lang="en-US" smtClean="0"/>
-              <a:t>6/5/19 4:28 PM</a:t>
+              <a:t>9/8/19 8:28 PM</a:t>
             </a:fld>
             <a:endParaRPr lang="en-US" dirty="0"/>
           </a:p>
@@ -3380,7 +3380,7 @@
           <a:p>
             <a:fld id="{D18B56EA-E28F-4F92-9F16-7A6F2501B303}" type="datetime8">
               <a:rPr lang="en-US" smtClean="0"/>
-              <a:t>6/5/19 4:28 PM</a:t>
+              <a:t>9/8/19 8:28 PM</a:t>
             </a:fld>
             <a:endParaRPr lang="en-US" dirty="0"/>
           </a:p>
@@ -3669,7 +3669,7 @@
           <a:p>
             <a:fld id="{D18B56EA-E28F-4F92-9F16-7A6F2501B303}" type="datetime8">
               <a:rPr lang="en-US" smtClean="0"/>
-              <a:t>6/5/19 4:28 PM</a:t>
+              <a:t>9/8/19 8:28 PM</a:t>
             </a:fld>
             <a:endParaRPr lang="en-US" dirty="0"/>
           </a:p>
@@ -3933,7 +3933,7 @@
           <a:p>
             <a:fld id="{D18B56EA-E28F-4F92-9F16-7A6F2501B303}" type="datetime8">
               <a:rPr lang="en-US" smtClean="0"/>
-              <a:t>6/5/19 4:28 PM</a:t>
+              <a:t>9/8/19 8:28 PM</a:t>
             </a:fld>
             <a:endParaRPr lang="en-US" dirty="0"/>
           </a:p>
@@ -4343,7 +4343,7 @@
           <a:p>
             <a:fld id="{D18B56EA-E28F-4F92-9F16-7A6F2501B303}" type="datetime8">
               <a:rPr lang="en-US" smtClean="0"/>
-              <a:t>6/5/19 4:28 PM</a:t>
+              <a:t>9/8/19 8:28 PM</a:t>
             </a:fld>
             <a:endParaRPr lang="en-US" dirty="0"/>
           </a:p>
@@ -4590,7 +4590,7 @@
           <a:p>
             <a:fld id="{D18B56EA-E28F-4F92-9F16-7A6F2501B303}" type="datetime8">
               <a:rPr lang="en-US" smtClean="0"/>
-              <a:t>6/5/19 4:28 PM</a:t>
+              <a:t>9/8/19 8:28 PM</a:t>
             </a:fld>
             <a:endParaRPr lang="en-US" dirty="0"/>
           </a:p>

</xml_diff>

<commit_message>
FY2020Q2 content refresh - officeaddins - m04
- update module to use latest yeoman generator for office
</commit_message>
<xml_diff>
--- a/OfficeAddin/04 Building Add-ins for Microsoft Outlook/02 Add-in Commands and Dialogs.pptx
+++ b/OfficeAddin/04 Building Add-ins for Microsoft Outlook/02 Add-in Commands and Dialogs.pptx
@@ -265,7 +265,7 @@
               <a:rPr lang="en-US" smtClean="0">
                 <a:latin typeface="Segoe UI" pitchFamily="34" charset="0"/>
               </a:rPr>
-              <a:t>9/8/19 8:28 PM</a:t>
+              <a:t>12/8/19 8:32 PM</a:t>
             </a:fld>
             <a:endParaRPr lang="en-US" dirty="0">
               <a:latin typeface="Segoe UI" pitchFamily="34" charset="0"/>
@@ -559,7 +559,7 @@
           <a:p>
             <a:fld id="{D18B56EA-E28F-4F92-9F16-7A6F2501B303}" type="datetime8">
               <a:rPr lang="en-US" smtClean="0"/>
-              <a:t>9/8/19 8:28 PM</a:t>
+              <a:t>12/8/19 8:32 PM</a:t>
             </a:fld>
             <a:endParaRPr lang="en-US" dirty="0"/>
           </a:p>
@@ -1047,7 +1047,7 @@
                 <a:tabLst/>
                 <a:defRPr/>
               </a:pPr>
-              <a:t>9/8/19 8:28 PM</a:t>
+              <a:t>12/8/19 8:32 PM</a:t>
             </a:fld>
             <a:endParaRPr kumimoji="0" lang="en-US" sz="1200" b="0" i="0" u="none" strike="noStrike" kern="1200" cap="none" spc="0" normalizeH="0" baseline="0" noProof="0" dirty="0">
               <a:ln>
@@ -1300,7 +1300,7 @@
           <a:p>
             <a:fld id="{D18B56EA-E28F-4F92-9F16-7A6F2501B303}" type="datetime8">
               <a:rPr lang="en-US" smtClean="0"/>
-              <a:t>9/8/19 8:28 PM</a:t>
+              <a:t>12/8/19 8:32 PM</a:t>
             </a:fld>
             <a:endParaRPr lang="en-US" dirty="0"/>
           </a:p>
@@ -1481,7 +1481,7 @@
           <a:p>
             <a:fld id="{D18B56EA-E28F-4F92-9F16-7A6F2501B303}" type="datetime8">
               <a:rPr lang="en-US" smtClean="0"/>
-              <a:t>9/8/19 8:28 PM</a:t>
+              <a:t>12/8/19 8:32 PM</a:t>
             </a:fld>
             <a:endParaRPr lang="en-US" dirty="0"/>
           </a:p>
@@ -1662,7 +1662,7 @@
           <a:p>
             <a:fld id="{D18B56EA-E28F-4F92-9F16-7A6F2501B303}" type="datetime8">
               <a:rPr lang="en-US" smtClean="0"/>
-              <a:t>9/8/19 8:28 PM</a:t>
+              <a:t>12/8/19 8:32 PM</a:t>
             </a:fld>
             <a:endParaRPr lang="en-US" dirty="0"/>
           </a:p>
@@ -1843,7 +1843,7 @@
           <a:p>
             <a:fld id="{D18B56EA-E28F-4F92-9F16-7A6F2501B303}" type="datetime8">
               <a:rPr lang="en-US" smtClean="0"/>
-              <a:t>9/8/19 8:28 PM</a:t>
+              <a:t>12/8/19 8:32 PM</a:t>
             </a:fld>
             <a:endParaRPr lang="en-US" dirty="0"/>
           </a:p>
@@ -2129,7 +2129,7 @@
                 <a:tabLst/>
                 <a:defRPr/>
               </a:pPr>
-              <a:t>9/8/19 8:28 PM</a:t>
+              <a:t>12/8/19 8:32 PM</a:t>
             </a:fld>
             <a:endParaRPr kumimoji="0" lang="en-US" sz="1200" b="0" i="0" u="none" strike="noStrike" kern="1200" cap="none" spc="0" normalizeH="0" baseline="0" noProof="0" dirty="0">
               <a:ln>
@@ -2794,7 +2794,7 @@
                 <a:tabLst/>
                 <a:defRPr/>
               </a:pPr>
-              <a:t>9/8/19 8:28 PM</a:t>
+              <a:t>12/8/19 8:32 PM</a:t>
             </a:fld>
             <a:endParaRPr kumimoji="0" lang="en-US" sz="1200" b="0" i="0" u="none" strike="noStrike" kern="1200" cap="none" spc="0" normalizeH="0" baseline="0" noProof="0" dirty="0">
               <a:ln>
@@ -3130,7 +3130,7 @@
           <a:p>
             <a:fld id="{D18B56EA-E28F-4F92-9F16-7A6F2501B303}" type="datetime8">
               <a:rPr lang="en-US" smtClean="0"/>
-              <a:t>9/8/19 8:28 PM</a:t>
+              <a:t>12/8/19 8:32 PM</a:t>
             </a:fld>
             <a:endParaRPr lang="en-US" dirty="0"/>
           </a:p>
@@ -3380,7 +3380,7 @@
           <a:p>
             <a:fld id="{D18B56EA-E28F-4F92-9F16-7A6F2501B303}" type="datetime8">
               <a:rPr lang="en-US" smtClean="0"/>
-              <a:t>9/8/19 8:28 PM</a:t>
+              <a:t>12/8/19 8:32 PM</a:t>
             </a:fld>
             <a:endParaRPr lang="en-US" dirty="0"/>
           </a:p>
@@ -3669,7 +3669,7 @@
           <a:p>
             <a:fld id="{D18B56EA-E28F-4F92-9F16-7A6F2501B303}" type="datetime8">
               <a:rPr lang="en-US" smtClean="0"/>
-              <a:t>9/8/19 8:28 PM</a:t>
+              <a:t>12/8/19 8:32 PM</a:t>
             </a:fld>
             <a:endParaRPr lang="en-US" dirty="0"/>
           </a:p>
@@ -3933,7 +3933,7 @@
           <a:p>
             <a:fld id="{D18B56EA-E28F-4F92-9F16-7A6F2501B303}" type="datetime8">
               <a:rPr lang="en-US" smtClean="0"/>
-              <a:t>9/8/19 8:28 PM</a:t>
+              <a:t>12/8/19 8:32 PM</a:t>
             </a:fld>
             <a:endParaRPr lang="en-US" dirty="0"/>
           </a:p>
@@ -4343,7 +4343,7 @@
           <a:p>
             <a:fld id="{D18B56EA-E28F-4F92-9F16-7A6F2501B303}" type="datetime8">
               <a:rPr lang="en-US" smtClean="0"/>
-              <a:t>9/8/19 8:28 PM</a:t>
+              <a:t>12/8/19 8:32 PM</a:t>
             </a:fld>
             <a:endParaRPr lang="en-US" dirty="0"/>
           </a:p>
@@ -4590,7 +4590,7 @@
           <a:p>
             <a:fld id="{D18B56EA-E28F-4F92-9F16-7A6F2501B303}" type="datetime8">
               <a:rPr lang="en-US" smtClean="0"/>
-              <a:t>9/8/19 8:28 PM</a:t>
+              <a:t>12/8/19 8:32 PM</a:t>
             </a:fld>
             <a:endParaRPr lang="en-US" dirty="0"/>
           </a:p>
@@ -15073,7 +15073,11 @@
           <a:p>
             <a:r>
               <a:rPr lang="en-US" dirty="0"/>
-              <a:t>Add-in Commands and Dialogs</a:t>
+              <a:t>Add-in Commands </a:t>
+            </a:r>
+            <a:r>
+              <a:rPr lang="en-US"/>
+              <a:t>and Dialogs </a:t>
             </a:r>
             <a:endParaRPr lang="en-US" dirty="0">
               <a:noFill/>

</xml_diff>

<commit_message>
FY2020Q3 content refresh: Office Addins - M04 (Outlook)
</commit_message>
<xml_diff>
--- a/OfficeAddin/04 Building Add-ins for Microsoft Outlook/02 Add-in Commands and Dialogs.pptx
+++ b/OfficeAddin/04 Building Add-ins for Microsoft Outlook/02 Add-in Commands and Dialogs.pptx
@@ -265,7 +265,7 @@
               <a:rPr lang="en-US" smtClean="0">
                 <a:latin typeface="Segoe UI" pitchFamily="34" charset="0"/>
               </a:rPr>
-              <a:t>12/8/19 8:32 PM</a:t>
+              <a:t>3/3/20 9:06 PM</a:t>
             </a:fld>
             <a:endParaRPr lang="en-US" dirty="0">
               <a:latin typeface="Segoe UI" pitchFamily="34" charset="0"/>
@@ -559,7 +559,7 @@
           <a:p>
             <a:fld id="{D18B56EA-E28F-4F92-9F16-7A6F2501B303}" type="datetime8">
               <a:rPr lang="en-US" smtClean="0"/>
-              <a:t>12/8/19 8:32 PM</a:t>
+              <a:t>3/3/20 9:06 PM</a:t>
             </a:fld>
             <a:endParaRPr lang="en-US" dirty="0"/>
           </a:p>
@@ -1047,7 +1047,7 @@
                 <a:tabLst/>
                 <a:defRPr/>
               </a:pPr>
-              <a:t>12/8/19 8:32 PM</a:t>
+              <a:t>3/3/20 9:06 PM</a:t>
             </a:fld>
             <a:endParaRPr kumimoji="0" lang="en-US" sz="1200" b="0" i="0" u="none" strike="noStrike" kern="1200" cap="none" spc="0" normalizeH="0" baseline="0" noProof="0" dirty="0">
               <a:ln>
@@ -1300,7 +1300,7 @@
           <a:p>
             <a:fld id="{D18B56EA-E28F-4F92-9F16-7A6F2501B303}" type="datetime8">
               <a:rPr lang="en-US" smtClean="0"/>
-              <a:t>12/8/19 8:32 PM</a:t>
+              <a:t>3/3/20 9:06 PM</a:t>
             </a:fld>
             <a:endParaRPr lang="en-US" dirty="0"/>
           </a:p>
@@ -1481,7 +1481,7 @@
           <a:p>
             <a:fld id="{D18B56EA-E28F-4F92-9F16-7A6F2501B303}" type="datetime8">
               <a:rPr lang="en-US" smtClean="0"/>
-              <a:t>12/8/19 8:32 PM</a:t>
+              <a:t>3/3/20 9:06 PM</a:t>
             </a:fld>
             <a:endParaRPr lang="en-US" dirty="0"/>
           </a:p>
@@ -1662,7 +1662,7 @@
           <a:p>
             <a:fld id="{D18B56EA-E28F-4F92-9F16-7A6F2501B303}" type="datetime8">
               <a:rPr lang="en-US" smtClean="0"/>
-              <a:t>12/8/19 8:32 PM</a:t>
+              <a:t>3/3/20 9:06 PM</a:t>
             </a:fld>
             <a:endParaRPr lang="en-US" dirty="0"/>
           </a:p>
@@ -1843,7 +1843,7 @@
           <a:p>
             <a:fld id="{D18B56EA-E28F-4F92-9F16-7A6F2501B303}" type="datetime8">
               <a:rPr lang="en-US" smtClean="0"/>
-              <a:t>12/8/19 8:32 PM</a:t>
+              <a:t>3/3/20 9:06 PM</a:t>
             </a:fld>
             <a:endParaRPr lang="en-US" dirty="0"/>
           </a:p>
@@ -2129,7 +2129,7 @@
                 <a:tabLst/>
                 <a:defRPr/>
               </a:pPr>
-              <a:t>12/8/19 8:32 PM</a:t>
+              <a:t>3/3/20 9:06 PM</a:t>
             </a:fld>
             <a:endParaRPr kumimoji="0" lang="en-US" sz="1200" b="0" i="0" u="none" strike="noStrike" kern="1200" cap="none" spc="0" normalizeH="0" baseline="0" noProof="0" dirty="0">
               <a:ln>
@@ -2794,7 +2794,7 @@
                 <a:tabLst/>
                 <a:defRPr/>
               </a:pPr>
-              <a:t>12/8/19 8:32 PM</a:t>
+              <a:t>3/3/20 9:06 PM</a:t>
             </a:fld>
             <a:endParaRPr kumimoji="0" lang="en-US" sz="1200" b="0" i="0" u="none" strike="noStrike" kern="1200" cap="none" spc="0" normalizeH="0" baseline="0" noProof="0" dirty="0">
               <a:ln>
@@ -3130,7 +3130,7 @@
           <a:p>
             <a:fld id="{D18B56EA-E28F-4F92-9F16-7A6F2501B303}" type="datetime8">
               <a:rPr lang="en-US" smtClean="0"/>
-              <a:t>12/8/19 8:32 PM</a:t>
+              <a:t>3/3/20 9:06 PM</a:t>
             </a:fld>
             <a:endParaRPr lang="en-US" dirty="0"/>
           </a:p>
@@ -3380,7 +3380,7 @@
           <a:p>
             <a:fld id="{D18B56EA-E28F-4F92-9F16-7A6F2501B303}" type="datetime8">
               <a:rPr lang="en-US" smtClean="0"/>
-              <a:t>12/8/19 8:32 PM</a:t>
+              <a:t>3/3/20 9:06 PM</a:t>
             </a:fld>
             <a:endParaRPr lang="en-US" dirty="0"/>
           </a:p>
@@ -3669,7 +3669,7 @@
           <a:p>
             <a:fld id="{D18B56EA-E28F-4F92-9F16-7A6F2501B303}" type="datetime8">
               <a:rPr lang="en-US" smtClean="0"/>
-              <a:t>12/8/19 8:32 PM</a:t>
+              <a:t>3/3/20 9:06 PM</a:t>
             </a:fld>
             <a:endParaRPr lang="en-US" dirty="0"/>
           </a:p>
@@ -3933,7 +3933,7 @@
           <a:p>
             <a:fld id="{D18B56EA-E28F-4F92-9F16-7A6F2501B303}" type="datetime8">
               <a:rPr lang="en-US" smtClean="0"/>
-              <a:t>12/8/19 8:32 PM</a:t>
+              <a:t>3/3/20 9:06 PM</a:t>
             </a:fld>
             <a:endParaRPr lang="en-US" dirty="0"/>
           </a:p>
@@ -4343,7 +4343,7 @@
           <a:p>
             <a:fld id="{D18B56EA-E28F-4F92-9F16-7A6F2501B303}" type="datetime8">
               <a:rPr lang="en-US" smtClean="0"/>
-              <a:t>12/8/19 8:32 PM</a:t>
+              <a:t>3/3/20 9:06 PM</a:t>
             </a:fld>
             <a:endParaRPr lang="en-US" dirty="0"/>
           </a:p>
@@ -4590,7 +4590,7 @@
           <a:p>
             <a:fld id="{D18B56EA-E28F-4F92-9F16-7A6F2501B303}" type="datetime8">
               <a:rPr lang="en-US" smtClean="0"/>
-              <a:t>12/8/19 8:32 PM</a:t>
+              <a:t>3/3/20 9:06 PM</a:t>
             </a:fld>
             <a:endParaRPr lang="en-US" dirty="0"/>
           </a:p>
@@ -15073,11 +15073,7 @@
           <a:p>
             <a:r>
               <a:rPr lang="en-US" dirty="0"/>
-              <a:t>Add-in Commands </a:t>
-            </a:r>
-            <a:r>
-              <a:rPr lang="en-US"/>
-              <a:t>and Dialogs </a:t>
+              <a:t>Add-in Commands and Dialogs  </a:t>
             </a:r>
             <a:endParaRPr lang="en-US" dirty="0">
               <a:noFill/>
@@ -15737,7 +15733,7 @@
                 <a:latin typeface="+mj-lt"/>
                 <a:hlinkClick r:id="rId3"/>
               </a:rPr>
-              <a:t>https://docs.microsoft.com/en-us/outlook/add-ins/add-in-commands-for-outlook</a:t>
+              <a:t>https://docs.microsoft.com/en-us/office/dev/add-ins/outlook/add-in-commands-for-outlook</a:t>
             </a:r>
             <a:endParaRPr lang="en-US" sz="1800" dirty="0">
               <a:latin typeface="+mj-lt"/>

</xml_diff>

<commit_message>
FY2020Q3 content refresh: Office Addins - M04 (Outlook) (#676)
</commit_message>
<xml_diff>
--- a/OfficeAddin/04 Building Add-ins for Microsoft Outlook/02 Add-in Commands and Dialogs.pptx
+++ b/OfficeAddin/04 Building Add-ins for Microsoft Outlook/02 Add-in Commands and Dialogs.pptx
@@ -265,7 +265,7 @@
               <a:rPr lang="en-US" smtClean="0">
                 <a:latin typeface="Segoe UI" pitchFamily="34" charset="0"/>
               </a:rPr>
-              <a:t>12/8/19 8:32 PM</a:t>
+              <a:t>3/3/20 9:06 PM</a:t>
             </a:fld>
             <a:endParaRPr lang="en-US" dirty="0">
               <a:latin typeface="Segoe UI" pitchFamily="34" charset="0"/>
@@ -559,7 +559,7 @@
           <a:p>
             <a:fld id="{D18B56EA-E28F-4F92-9F16-7A6F2501B303}" type="datetime8">
               <a:rPr lang="en-US" smtClean="0"/>
-              <a:t>12/8/19 8:32 PM</a:t>
+              <a:t>3/3/20 9:06 PM</a:t>
             </a:fld>
             <a:endParaRPr lang="en-US" dirty="0"/>
           </a:p>
@@ -1047,7 +1047,7 @@
                 <a:tabLst/>
                 <a:defRPr/>
               </a:pPr>
-              <a:t>12/8/19 8:32 PM</a:t>
+              <a:t>3/3/20 9:06 PM</a:t>
             </a:fld>
             <a:endParaRPr kumimoji="0" lang="en-US" sz="1200" b="0" i="0" u="none" strike="noStrike" kern="1200" cap="none" spc="0" normalizeH="0" baseline="0" noProof="0" dirty="0">
               <a:ln>
@@ -1300,7 +1300,7 @@
           <a:p>
             <a:fld id="{D18B56EA-E28F-4F92-9F16-7A6F2501B303}" type="datetime8">
               <a:rPr lang="en-US" smtClean="0"/>
-              <a:t>12/8/19 8:32 PM</a:t>
+              <a:t>3/3/20 9:06 PM</a:t>
             </a:fld>
             <a:endParaRPr lang="en-US" dirty="0"/>
           </a:p>
@@ -1481,7 +1481,7 @@
           <a:p>
             <a:fld id="{D18B56EA-E28F-4F92-9F16-7A6F2501B303}" type="datetime8">
               <a:rPr lang="en-US" smtClean="0"/>
-              <a:t>12/8/19 8:32 PM</a:t>
+              <a:t>3/3/20 9:06 PM</a:t>
             </a:fld>
             <a:endParaRPr lang="en-US" dirty="0"/>
           </a:p>
@@ -1662,7 +1662,7 @@
           <a:p>
             <a:fld id="{D18B56EA-E28F-4F92-9F16-7A6F2501B303}" type="datetime8">
               <a:rPr lang="en-US" smtClean="0"/>
-              <a:t>12/8/19 8:32 PM</a:t>
+              <a:t>3/3/20 9:06 PM</a:t>
             </a:fld>
             <a:endParaRPr lang="en-US" dirty="0"/>
           </a:p>
@@ -1843,7 +1843,7 @@
           <a:p>
             <a:fld id="{D18B56EA-E28F-4F92-9F16-7A6F2501B303}" type="datetime8">
               <a:rPr lang="en-US" smtClean="0"/>
-              <a:t>12/8/19 8:32 PM</a:t>
+              <a:t>3/3/20 9:06 PM</a:t>
             </a:fld>
             <a:endParaRPr lang="en-US" dirty="0"/>
           </a:p>
@@ -2129,7 +2129,7 @@
                 <a:tabLst/>
                 <a:defRPr/>
               </a:pPr>
-              <a:t>12/8/19 8:32 PM</a:t>
+              <a:t>3/3/20 9:06 PM</a:t>
             </a:fld>
             <a:endParaRPr kumimoji="0" lang="en-US" sz="1200" b="0" i="0" u="none" strike="noStrike" kern="1200" cap="none" spc="0" normalizeH="0" baseline="0" noProof="0" dirty="0">
               <a:ln>
@@ -2794,7 +2794,7 @@
                 <a:tabLst/>
                 <a:defRPr/>
               </a:pPr>
-              <a:t>12/8/19 8:32 PM</a:t>
+              <a:t>3/3/20 9:06 PM</a:t>
             </a:fld>
             <a:endParaRPr kumimoji="0" lang="en-US" sz="1200" b="0" i="0" u="none" strike="noStrike" kern="1200" cap="none" spc="0" normalizeH="0" baseline="0" noProof="0" dirty="0">
               <a:ln>
@@ -3130,7 +3130,7 @@
           <a:p>
             <a:fld id="{D18B56EA-E28F-4F92-9F16-7A6F2501B303}" type="datetime8">
               <a:rPr lang="en-US" smtClean="0"/>
-              <a:t>12/8/19 8:32 PM</a:t>
+              <a:t>3/3/20 9:06 PM</a:t>
             </a:fld>
             <a:endParaRPr lang="en-US" dirty="0"/>
           </a:p>
@@ -3380,7 +3380,7 @@
           <a:p>
             <a:fld id="{D18B56EA-E28F-4F92-9F16-7A6F2501B303}" type="datetime8">
               <a:rPr lang="en-US" smtClean="0"/>
-              <a:t>12/8/19 8:32 PM</a:t>
+              <a:t>3/3/20 9:06 PM</a:t>
             </a:fld>
             <a:endParaRPr lang="en-US" dirty="0"/>
           </a:p>
@@ -3669,7 +3669,7 @@
           <a:p>
             <a:fld id="{D18B56EA-E28F-4F92-9F16-7A6F2501B303}" type="datetime8">
               <a:rPr lang="en-US" smtClean="0"/>
-              <a:t>12/8/19 8:32 PM</a:t>
+              <a:t>3/3/20 9:06 PM</a:t>
             </a:fld>
             <a:endParaRPr lang="en-US" dirty="0"/>
           </a:p>
@@ -3933,7 +3933,7 @@
           <a:p>
             <a:fld id="{D18B56EA-E28F-4F92-9F16-7A6F2501B303}" type="datetime8">
               <a:rPr lang="en-US" smtClean="0"/>
-              <a:t>12/8/19 8:32 PM</a:t>
+              <a:t>3/3/20 9:06 PM</a:t>
             </a:fld>
             <a:endParaRPr lang="en-US" dirty="0"/>
           </a:p>
@@ -4343,7 +4343,7 @@
           <a:p>
             <a:fld id="{D18B56EA-E28F-4F92-9F16-7A6F2501B303}" type="datetime8">
               <a:rPr lang="en-US" smtClean="0"/>
-              <a:t>12/8/19 8:32 PM</a:t>
+              <a:t>3/3/20 9:06 PM</a:t>
             </a:fld>
             <a:endParaRPr lang="en-US" dirty="0"/>
           </a:p>
@@ -4590,7 +4590,7 @@
           <a:p>
             <a:fld id="{D18B56EA-E28F-4F92-9F16-7A6F2501B303}" type="datetime8">
               <a:rPr lang="en-US" smtClean="0"/>
-              <a:t>12/8/19 8:32 PM</a:t>
+              <a:t>3/3/20 9:06 PM</a:t>
             </a:fld>
             <a:endParaRPr lang="en-US" dirty="0"/>
           </a:p>
@@ -15073,11 +15073,7 @@
           <a:p>
             <a:r>
               <a:rPr lang="en-US" dirty="0"/>
-              <a:t>Add-in Commands </a:t>
-            </a:r>
-            <a:r>
-              <a:rPr lang="en-US"/>
-              <a:t>and Dialogs </a:t>
+              <a:t>Add-in Commands and Dialogs  </a:t>
             </a:r>
             <a:endParaRPr lang="en-US" dirty="0">
               <a:noFill/>
@@ -15737,7 +15733,7 @@
                 <a:latin typeface="+mj-lt"/>
                 <a:hlinkClick r:id="rId3"/>
               </a:rPr>
-              <a:t>https://docs.microsoft.com/en-us/outlook/add-ins/add-in-commands-for-outlook</a:t>
+              <a:t>https://docs.microsoft.com/en-us/office/dev/add-ins/outlook/add-in-commands-for-outlook</a:t>
             </a:r>
             <a:endParaRPr lang="en-US" sz="1800" dirty="0">
               <a:latin typeface="+mj-lt"/>

</xml_diff>

<commit_message>
Port module to Microsoft Learn format (OfficeAddin): "Build Office add-ins for Microsoft Outlook"
</commit_message>
<xml_diff>
--- a/OfficeAddin/04 Building Add-ins for Microsoft Outlook/02 Add-in Commands and Dialogs.pptx
+++ b/OfficeAddin/04 Building Add-ins for Microsoft Outlook/02 Add-in Commands and Dialogs.pptx
@@ -265,7 +265,7 @@
               <a:rPr lang="en-US" smtClean="0">
                 <a:latin typeface="Segoe UI" pitchFamily="34" charset="0"/>
               </a:rPr>
-              <a:t>3/3/20 9:06 PM</a:t>
+              <a:t>4/7/20 3:27 PM</a:t>
             </a:fld>
             <a:endParaRPr lang="en-US" dirty="0">
               <a:latin typeface="Segoe UI" pitchFamily="34" charset="0"/>
@@ -559,7 +559,7 @@
           <a:p>
             <a:fld id="{D18B56EA-E28F-4F92-9F16-7A6F2501B303}" type="datetime8">
               <a:rPr lang="en-US" smtClean="0"/>
-              <a:t>3/3/20 9:06 PM</a:t>
+              <a:t>4/7/20 3:27 PM</a:t>
             </a:fld>
             <a:endParaRPr lang="en-US" dirty="0"/>
           </a:p>
@@ -848,7 +848,32 @@
           <a:bodyPr/>
           <a:lstStyle/>
           <a:p>
-            <a:endParaRPr lang="en-US" dirty="0"/>
+            <a:pPr marL="0" marR="0" lvl="0" indent="0" algn="l" defTabSz="932742" rtl="0" eaLnBrk="1" fontAlgn="auto" latinLnBrk="0" hangingPunct="1">
+              <a:lnSpc>
+                <a:spcPct val="90000"/>
+              </a:lnSpc>
+              <a:spcBef>
+                <a:spcPts val="0"/>
+              </a:spcBef>
+              <a:spcAft>
+                <a:spcPts val="340"/>
+              </a:spcAft>
+              <a:buClrTx/>
+              <a:buSzTx/>
+              <a:buFontTx/>
+              <a:buNone/>
+              <a:tabLst/>
+              <a:defRPr/>
+            </a:pPr>
+            <a:endParaRPr lang="en-US" sz="900" b="0" kern="1200" dirty="0">
+              <a:solidFill>
+                <a:schemeClr val="tx1"/>
+              </a:solidFill>
+              <a:effectLst/>
+              <a:latin typeface="Segoe UI Light" pitchFamily="34" charset="0"/>
+              <a:ea typeface="+mn-ea"/>
+              <a:cs typeface="+mn-cs"/>
+            </a:endParaRPr>
           </a:p>
         </p:txBody>
       </p:sp>
@@ -1047,7 +1072,7 @@
                 <a:tabLst/>
                 <a:defRPr/>
               </a:pPr>
-              <a:t>3/3/20 9:06 PM</a:t>
+              <a:t>4/7/20 4:03 PM</a:t>
             </a:fld>
             <a:endParaRPr kumimoji="0" lang="en-US" sz="1200" b="0" i="0" u="none" strike="noStrike" kern="1200" cap="none" spc="0" normalizeH="0" baseline="0" noProof="0" dirty="0">
               <a:ln>
@@ -1300,7 +1325,7 @@
           <a:p>
             <a:fld id="{D18B56EA-E28F-4F92-9F16-7A6F2501B303}" type="datetime8">
               <a:rPr lang="en-US" smtClean="0"/>
-              <a:t>3/3/20 9:06 PM</a:t>
+              <a:t>4/7/20 3:27 PM</a:t>
             </a:fld>
             <a:endParaRPr lang="en-US" dirty="0"/>
           </a:p>
@@ -1481,7 +1506,7 @@
           <a:p>
             <a:fld id="{D18B56EA-E28F-4F92-9F16-7A6F2501B303}" type="datetime8">
               <a:rPr lang="en-US" smtClean="0"/>
-              <a:t>3/3/20 9:06 PM</a:t>
+              <a:t>4/7/20 3:27 PM</a:t>
             </a:fld>
             <a:endParaRPr lang="en-US" dirty="0"/>
           </a:p>
@@ -1662,7 +1687,7 @@
           <a:p>
             <a:fld id="{D18B56EA-E28F-4F92-9F16-7A6F2501B303}" type="datetime8">
               <a:rPr lang="en-US" smtClean="0"/>
-              <a:t>3/3/20 9:06 PM</a:t>
+              <a:t>4/7/20 3:27 PM</a:t>
             </a:fld>
             <a:endParaRPr lang="en-US" dirty="0"/>
           </a:p>
@@ -1843,7 +1868,7 @@
           <a:p>
             <a:fld id="{D18B56EA-E28F-4F92-9F16-7A6F2501B303}" type="datetime8">
               <a:rPr lang="en-US" smtClean="0"/>
-              <a:t>3/3/20 9:06 PM</a:t>
+              <a:t>4/7/20 3:27 PM</a:t>
             </a:fld>
             <a:endParaRPr lang="en-US" dirty="0"/>
           </a:p>
@@ -1930,7 +1955,13 @@
           <a:bodyPr/>
           <a:lstStyle/>
           <a:p>
-            <a:endParaRPr lang="en-US"/>
+            <a:r>
+              <a:rPr lang="en-US" dirty="0"/>
+              <a:t>In this unit, you'll learn how to create add-in commands and work with dialogs to display information, or prompt the user for input.</a:t>
+            </a:r>
+          </a:p>
+          <a:p>
+            <a:endParaRPr lang="en-US" dirty="0"/>
           </a:p>
         </p:txBody>
       </p:sp>
@@ -2129,7 +2160,7 @@
                 <a:tabLst/>
                 <a:defRPr/>
               </a:pPr>
-              <a:t>3/3/20 9:06 PM</a:t>
+              <a:t>4/7/20 4:04 PM</a:t>
             </a:fld>
             <a:endParaRPr kumimoji="0" lang="en-US" sz="1200" b="0" i="0" u="none" strike="noStrike" kern="1200" cap="none" spc="0" normalizeH="0" baseline="0" noProof="0" dirty="0">
               <a:ln>
@@ -2303,59 +2334,7 @@
                 </a:solidFill>
                 <a:latin typeface="Segoe UI Semibold"/>
               </a:rPr>
-              <a:t>Add-in commands</a:t>
-            </a:r>
-          </a:p>
-          <a:p>
-            <a:pPr>
-              <a:lnSpc>
-                <a:spcPct val="90000"/>
-              </a:lnSpc>
-              <a:spcBef>
-                <a:spcPts val="600"/>
-              </a:spcBef>
-            </a:pPr>
-            <a:r>
-              <a:rPr lang="en-US" sz="900" dirty="0">
-                <a:solidFill>
-                  <a:srgbClr val="2F2F2F"/>
-                </a:solidFill>
-              </a:rPr>
-              <a:t>Add-in commands provide an easy way to customize the default Office user interface (UI) with specified UI elements that perform actions. </a:t>
-            </a:r>
-          </a:p>
-          <a:p>
-            <a:pPr>
-              <a:lnSpc>
-                <a:spcPct val="90000"/>
-              </a:lnSpc>
-              <a:spcBef>
-                <a:spcPts val="600"/>
-              </a:spcBef>
-            </a:pPr>
-            <a:r>
-              <a:rPr lang="en-US" sz="900" dirty="0">
-                <a:solidFill>
-                  <a:srgbClr val="2F2F2F"/>
-                </a:solidFill>
-              </a:rPr>
-              <a:t>Add-in commands are configured in the </a:t>
-            </a:r>
-            <a:r>
-              <a:rPr lang="en-US" sz="900" dirty="0" err="1">
-                <a:solidFill>
-                  <a:srgbClr val="2F2F2F"/>
-                </a:solidFill>
-              </a:rPr>
-              <a:t>VersionOverrides</a:t>
-            </a:r>
-            <a:r>
-              <a:rPr lang="en-US" sz="900" dirty="0">
-                <a:solidFill>
-                  <a:srgbClr val="2F2F2F"/>
-                </a:solidFill>
-              </a:rPr>
-              <a:t> element of an add-in manifest.</a:t>
+              <a:t>Add-in commands provide an easy way to customize the default Office user interface (UI) with specified UI elements that do actions.</a:t>
             </a:r>
           </a:p>
           <a:p>
@@ -2367,14 +2346,12 @@
                 <a:spcPts val="600"/>
               </a:spcBef>
             </a:pPr>
-            <a:r>
-              <a:rPr lang="en-US" sz="900" dirty="0">
-                <a:solidFill>
-                  <a:srgbClr val="2F2F2F"/>
-                </a:solidFill>
-              </a:rPr>
-              <a:t>Add-in commands can extend existing context menus and ribbon tabs/groups or create entirely new custom ribbon tabs/groups.</a:t>
-            </a:r>
+            <a:endParaRPr lang="en-US" b="1" dirty="0">
+              <a:solidFill>
+                <a:srgbClr val="D83B01"/>
+              </a:solidFill>
+              <a:latin typeface="Segoe UI Semibold"/>
+            </a:endParaRPr>
           </a:p>
           <a:p>
             <a:pPr lvl="0">
@@ -2385,21 +2362,15 @@
                 <a:spcPts val="600"/>
               </a:spcBef>
             </a:pPr>
-            <a:endParaRPr lang="en-US" sz="900" dirty="0">
-              <a:solidFill>
-                <a:srgbClr val="2F2F2F"/>
-              </a:solidFill>
-            </a:endParaRPr>
-          </a:p>
-          <a:p>
-            <a:pPr>
-              <a:lnSpc>
-                <a:spcPct val="90000"/>
-              </a:lnSpc>
-              <a:spcBef>
-                <a:spcPts val="600"/>
-              </a:spcBef>
-            </a:pPr>
+            <a:r>
+              <a:rPr lang="en-US" b="1" dirty="0">
+                <a:solidFill>
+                  <a:srgbClr val="D83B01"/>
+                </a:solidFill>
+                <a:latin typeface="Segoe UI Semibold"/>
+              </a:rPr>
+              <a:t>Add-in commands are configured in the `</a:t>
+            </a:r>
             <a:r>
               <a:rPr lang="en-US" b="1" dirty="0" err="1">
                 <a:solidFill>
@@ -2407,7 +2378,7 @@
                 </a:solidFill>
                 <a:latin typeface="Segoe UI Semibold"/>
               </a:rPr>
-              <a:t>ExtensionPoint</a:t>
+              <a:t>VersionOverrides</a:t>
             </a:r>
             <a:r>
               <a:rPr lang="en-US" b="1" dirty="0">
@@ -2416,23 +2387,8 @@
                 </a:solidFill>
                 <a:latin typeface="Segoe UI Semibold"/>
               </a:rPr>
-              <a:t> </a:t>
-            </a:r>
-            <a:r>
-              <a:rPr lang="en-US" b="1" dirty="0" err="1">
-                <a:solidFill>
-                  <a:srgbClr val="D83B01"/>
-                </a:solidFill>
-                <a:latin typeface="Segoe UI Semibold"/>
-              </a:rPr>
-              <a:t>elemements</a:t>
-            </a:r>
-            <a:endParaRPr lang="en-US" b="1" dirty="0">
-              <a:solidFill>
-                <a:srgbClr val="D83B01"/>
-              </a:solidFill>
-              <a:latin typeface="Segoe UI Semibold"/>
-            </a:endParaRPr>
+              <a:t>` element of an add-in manifest.</a:t>
+            </a:r>
           </a:p>
           <a:p>
             <a:pPr lvl="0">
@@ -2443,91 +2399,12 @@
                 <a:spcPts val="600"/>
               </a:spcBef>
             </a:pPr>
-            <a:r>
-              <a:rPr lang="en-US" sz="900" dirty="0">
-                <a:solidFill>
-                  <a:srgbClr val="2F2F2F"/>
-                </a:solidFill>
-              </a:rPr>
-              <a:t>The </a:t>
-            </a:r>
-            <a:r>
-              <a:rPr lang="en-US" sz="900" dirty="0" err="1">
-                <a:solidFill>
-                  <a:srgbClr val="2F2F2F"/>
-                </a:solidFill>
-              </a:rPr>
-              <a:t>ExtensionPoint</a:t>
-            </a:r>
-            <a:r>
-              <a:rPr lang="en-US" sz="900" dirty="0">
-                <a:solidFill>
-                  <a:srgbClr val="2F2F2F"/>
-                </a:solidFill>
-              </a:rPr>
-              <a:t> element defines where add-in commands should appear in the Office UI, including in the ribbon (both custom and existing tabs) and context menus from right-clicking in the Office UI.</a:t>
-            </a:r>
-          </a:p>
-          <a:p>
-            <a:pPr>
-              <a:lnSpc>
-                <a:spcPct val="90000"/>
-              </a:lnSpc>
-              <a:spcBef>
-                <a:spcPts val="600"/>
-              </a:spcBef>
-            </a:pPr>
-            <a:r>
-              <a:rPr lang="en-US" sz="900" dirty="0">
-                <a:solidFill>
-                  <a:srgbClr val="2F2F2F"/>
-                </a:solidFill>
-              </a:rPr>
-              <a:t>Add-in commands support button and menu controls, where buttons perform a single action and menus provide a submenu of actions.</a:t>
-            </a:r>
-          </a:p>
-          <a:p>
-            <a:pPr>
-              <a:lnSpc>
-                <a:spcPct val="90000"/>
-              </a:lnSpc>
-              <a:spcBef>
-                <a:spcPts val="600"/>
-              </a:spcBef>
-            </a:pPr>
-            <a:r>
-              <a:rPr lang="en-US" sz="900" dirty="0">
-                <a:solidFill>
-                  <a:srgbClr val="2F2F2F"/>
-                </a:solidFill>
-              </a:rPr>
-              <a:t>.</a:t>
-            </a:r>
             <a:endParaRPr lang="en-US" b="1" dirty="0">
               <a:solidFill>
                 <a:srgbClr val="D83B01"/>
               </a:solidFill>
               <a:latin typeface="Segoe UI Semibold"/>
             </a:endParaRPr>
-          </a:p>
-          <a:p>
-            <a:pPr>
-              <a:lnSpc>
-                <a:spcPct val="90000"/>
-              </a:lnSpc>
-              <a:spcBef>
-                <a:spcPts val="600"/>
-              </a:spcBef>
-            </a:pPr>
-            <a:r>
-              <a:rPr lang="en-US" b="1" dirty="0">
-                <a:solidFill>
-                  <a:srgbClr val="D83B01"/>
-                </a:solidFill>
-                <a:latin typeface="Segoe UI Semibold"/>
-              </a:rPr>
-              <a:t>Commands actions</a:t>
-            </a:r>
           </a:p>
           <a:p>
             <a:pPr lvl="0">
@@ -2539,20 +2416,13 @@
               </a:spcBef>
             </a:pPr>
             <a:r>
-              <a:rPr lang="en-US" sz="900" dirty="0" err="1">
-                <a:solidFill>
-                  <a:srgbClr val="2F2F2F"/>
-                </a:solidFill>
-              </a:rPr>
-              <a:t>ShowTaskpane</a:t>
-            </a:r>
-            <a:r>
-              <a:rPr lang="en-US" sz="900" dirty="0">
-                <a:solidFill>
-                  <a:srgbClr val="2F2F2F"/>
-                </a:solidFill>
-              </a:rPr>
-              <a:t> is the most common action for an add-in command. It is used to launch the add-in in a task pane and is part of most Office add-in templates/generators.</a:t>
+              <a:rPr lang="en-US" b="1" dirty="0">
+                <a:solidFill>
+                  <a:srgbClr val="D83B01"/>
+                </a:solidFill>
+                <a:latin typeface="Segoe UI Semibold"/>
+              </a:rPr>
+              <a:t>Add-in commands can extend existing context menus, ribbon tabs and groups, or create new custom ribbon tabs and groups.</a:t>
             </a:r>
           </a:p>
           <a:p>
@@ -2564,38 +2434,355 @@
                 <a:spcPts val="600"/>
               </a:spcBef>
             </a:pPr>
-            <a:r>
-              <a:rPr lang="en-US" sz="900" dirty="0" err="1">
-                <a:solidFill>
-                  <a:srgbClr val="2F2F2F"/>
-                </a:solidFill>
+            <a:endParaRPr lang="en-US" b="1" dirty="0">
+              <a:solidFill>
+                <a:srgbClr val="D83B01"/>
+              </a:solidFill>
+              <a:latin typeface="Segoe UI Semibold"/>
+            </a:endParaRPr>
+          </a:p>
+          <a:p>
+            <a:pPr lvl="0">
+              <a:lnSpc>
+                <a:spcPct val="90000"/>
+              </a:lnSpc>
+              <a:spcBef>
+                <a:spcPts val="600"/>
+              </a:spcBef>
+            </a:pPr>
+            <a:r>
+              <a:rPr lang="en-US" b="1" dirty="0">
+                <a:solidFill>
+                  <a:srgbClr val="D83B01"/>
+                </a:solidFill>
+                <a:latin typeface="Segoe UI Semibold"/>
+              </a:rPr>
+              <a:t>### </a:t>
+            </a:r>
+            <a:r>
+              <a:rPr lang="en-US" b="1" dirty="0" err="1">
+                <a:solidFill>
+                  <a:srgbClr val="D83B01"/>
+                </a:solidFill>
+                <a:latin typeface="Segoe UI Semibold"/>
+              </a:rPr>
+              <a:t>ExtensionPoint</a:t>
+            </a:r>
+            <a:r>
+              <a:rPr lang="en-US" b="1" dirty="0">
+                <a:solidFill>
+                  <a:srgbClr val="D83B01"/>
+                </a:solidFill>
+                <a:latin typeface="Segoe UI Semibold"/>
+              </a:rPr>
+              <a:t> element</a:t>
+            </a:r>
+          </a:p>
+          <a:p>
+            <a:pPr lvl="0">
+              <a:lnSpc>
+                <a:spcPct val="90000"/>
+              </a:lnSpc>
+              <a:spcBef>
+                <a:spcPts val="600"/>
+              </a:spcBef>
+            </a:pPr>
+            <a:endParaRPr lang="en-US" b="1" dirty="0">
+              <a:solidFill>
+                <a:srgbClr val="D83B01"/>
+              </a:solidFill>
+              <a:latin typeface="Segoe UI Semibold"/>
+            </a:endParaRPr>
+          </a:p>
+          <a:p>
+            <a:pPr lvl="0">
+              <a:lnSpc>
+                <a:spcPct val="90000"/>
+              </a:lnSpc>
+              <a:spcBef>
+                <a:spcPts val="600"/>
+              </a:spcBef>
+            </a:pPr>
+            <a:r>
+              <a:rPr lang="en-US" b="1" dirty="0">
+                <a:solidFill>
+                  <a:srgbClr val="D83B01"/>
+                </a:solidFill>
+                <a:latin typeface="Segoe UI Semibold"/>
+              </a:rPr>
+              <a:t>The `</a:t>
+            </a:r>
+            <a:r>
+              <a:rPr lang="en-US" b="1" dirty="0" err="1">
+                <a:solidFill>
+                  <a:srgbClr val="D83B01"/>
+                </a:solidFill>
+                <a:latin typeface="Segoe UI Semibold"/>
+              </a:rPr>
+              <a:t>ExtensionPoint</a:t>
+            </a:r>
+            <a:r>
+              <a:rPr lang="en-US" b="1" dirty="0">
+                <a:solidFill>
+                  <a:srgbClr val="D83B01"/>
+                </a:solidFill>
+                <a:latin typeface="Segoe UI Semibold"/>
+              </a:rPr>
+              <a:t>` element defines where add-in commands should appear in the Office UI, including in an existing ribbon tab (*</a:t>
+            </a:r>
+            <a:r>
+              <a:rPr lang="en-US" b="1" dirty="0" err="1">
+                <a:solidFill>
+                  <a:srgbClr val="D83B01"/>
+                </a:solidFill>
+                <a:latin typeface="Segoe UI Semibold"/>
+              </a:rPr>
+              <a:t>OfficeTab</a:t>
+            </a:r>
+            <a:r>
+              <a:rPr lang="en-US" b="1" dirty="0">
+                <a:solidFill>
+                  <a:srgbClr val="D83B01"/>
+                </a:solidFill>
+                <a:latin typeface="Segoe UI Semibold"/>
+              </a:rPr>
+              <a:t>*), a custom tab (*</a:t>
+            </a:r>
+            <a:r>
+              <a:rPr lang="en-US" b="1" dirty="0" err="1">
+                <a:solidFill>
+                  <a:srgbClr val="D83B01"/>
+                </a:solidFill>
+                <a:latin typeface="Segoe UI Semibold"/>
+              </a:rPr>
+              <a:t>CustomTab</a:t>
+            </a:r>
+            <a:r>
+              <a:rPr lang="en-US" b="1" dirty="0">
+                <a:solidFill>
+                  <a:srgbClr val="D83B01"/>
+                </a:solidFill>
+                <a:latin typeface="Segoe UI Semibold"/>
+              </a:rPr>
+              <a:t>*), or in a context menu available by right-clicking in the Office UI (*</a:t>
+            </a:r>
+            <a:r>
+              <a:rPr lang="en-US" b="1" dirty="0" err="1">
+                <a:solidFill>
+                  <a:srgbClr val="D83B01"/>
+                </a:solidFill>
+                <a:latin typeface="Segoe UI Semibold"/>
+              </a:rPr>
+              <a:t>OfficeMenu</a:t>
+            </a:r>
+            <a:r>
+              <a:rPr lang="en-US" b="1" dirty="0">
+                <a:solidFill>
+                  <a:srgbClr val="D83B01"/>
+                </a:solidFill>
+                <a:latin typeface="Segoe UI Semibold"/>
+              </a:rPr>
+              <a:t>*).</a:t>
+            </a:r>
+          </a:p>
+          <a:p>
+            <a:pPr lvl="0">
+              <a:lnSpc>
+                <a:spcPct val="90000"/>
+              </a:lnSpc>
+              <a:spcBef>
+                <a:spcPts val="600"/>
+              </a:spcBef>
+            </a:pPr>
+            <a:endParaRPr lang="en-US" b="1" dirty="0">
+              <a:solidFill>
+                <a:srgbClr val="D83B01"/>
+              </a:solidFill>
+              <a:latin typeface="Segoe UI Semibold"/>
+            </a:endParaRPr>
+          </a:p>
+          <a:p>
+            <a:pPr lvl="0">
+              <a:lnSpc>
+                <a:spcPct val="90000"/>
+              </a:lnSpc>
+              <a:spcBef>
+                <a:spcPts val="600"/>
+              </a:spcBef>
+            </a:pPr>
+            <a:r>
+              <a:rPr lang="en-US" b="1" dirty="0">
+                <a:solidFill>
+                  <a:srgbClr val="D83B01"/>
+                </a:solidFill>
+                <a:latin typeface="Segoe UI Semibold"/>
+              </a:rPr>
+              <a:t>Add-in commands support button and menu controls. Buttons do a single action and menus provide a submenu of actions.</a:t>
+            </a:r>
+          </a:p>
+          <a:p>
+            <a:pPr lvl="0">
+              <a:lnSpc>
+                <a:spcPct val="90000"/>
+              </a:lnSpc>
+              <a:spcBef>
+                <a:spcPts val="600"/>
+              </a:spcBef>
+            </a:pPr>
+            <a:endParaRPr lang="en-US" b="1" dirty="0">
+              <a:solidFill>
+                <a:srgbClr val="D83B01"/>
+              </a:solidFill>
+              <a:latin typeface="Segoe UI Semibold"/>
+            </a:endParaRPr>
+          </a:p>
+          <a:p>
+            <a:pPr lvl="0">
+              <a:lnSpc>
+                <a:spcPct val="90000"/>
+              </a:lnSpc>
+              <a:spcBef>
+                <a:spcPts val="600"/>
+              </a:spcBef>
+            </a:pPr>
+            <a:r>
+              <a:rPr lang="en-US" b="1" dirty="0">
+                <a:solidFill>
+                  <a:srgbClr val="D83B01"/>
+                </a:solidFill>
+                <a:latin typeface="Segoe UI Semibold"/>
+              </a:rPr>
+              <a:t>### Commands actions</a:t>
+            </a:r>
+          </a:p>
+          <a:p>
+            <a:pPr lvl="0">
+              <a:lnSpc>
+                <a:spcPct val="90000"/>
+              </a:lnSpc>
+              <a:spcBef>
+                <a:spcPts val="600"/>
+              </a:spcBef>
+            </a:pPr>
+            <a:endParaRPr lang="en-US" b="1" dirty="0">
+              <a:solidFill>
+                <a:srgbClr val="D83B01"/>
+              </a:solidFill>
+              <a:latin typeface="Segoe UI Semibold"/>
+            </a:endParaRPr>
+          </a:p>
+          <a:p>
+            <a:pPr lvl="0">
+              <a:lnSpc>
+                <a:spcPct val="90000"/>
+              </a:lnSpc>
+              <a:spcBef>
+                <a:spcPts val="600"/>
+              </a:spcBef>
+            </a:pPr>
+            <a:r>
+              <a:rPr lang="en-US" b="1" dirty="0">
+                <a:solidFill>
+                  <a:srgbClr val="D83B01"/>
+                </a:solidFill>
+                <a:latin typeface="Segoe UI Semibold"/>
+              </a:rPr>
+              <a:t>The `</a:t>
+            </a:r>
+            <a:r>
+              <a:rPr lang="en-US" b="1" dirty="0" err="1">
+                <a:solidFill>
+                  <a:srgbClr val="D83B01"/>
+                </a:solidFill>
+                <a:latin typeface="Segoe UI Semibold"/>
+              </a:rPr>
+              <a:t>ShowTaskpane</a:t>
+            </a:r>
+            <a:r>
+              <a:rPr lang="en-US" b="1" dirty="0">
+                <a:solidFill>
+                  <a:srgbClr val="D83B01"/>
+                </a:solidFill>
+                <a:latin typeface="Segoe UI Semibold"/>
+              </a:rPr>
+              <a:t>()` action is the most common for an add-in command. It's used to launch the add-in in a task pane. Using an add-in command to launch an add-in is considered a best practice and is incorporated in most Office add-in templates and generators.</a:t>
+            </a:r>
+          </a:p>
+          <a:p>
+            <a:pPr lvl="0">
+              <a:lnSpc>
+                <a:spcPct val="90000"/>
+              </a:lnSpc>
+              <a:spcBef>
+                <a:spcPts val="600"/>
+              </a:spcBef>
+            </a:pPr>
+            <a:endParaRPr lang="en-US" b="1" dirty="0">
+              <a:solidFill>
+                <a:srgbClr val="D83B01"/>
+              </a:solidFill>
+              <a:latin typeface="Segoe UI Semibold"/>
+            </a:endParaRPr>
+          </a:p>
+          <a:p>
+            <a:pPr lvl="0">
+              <a:lnSpc>
+                <a:spcPct val="90000"/>
+              </a:lnSpc>
+              <a:spcBef>
+                <a:spcPts val="600"/>
+              </a:spcBef>
+            </a:pPr>
+            <a:r>
+              <a:rPr lang="en-US" b="1" dirty="0">
+                <a:solidFill>
+                  <a:srgbClr val="D83B01"/>
+                </a:solidFill>
+                <a:latin typeface="Segoe UI Semibold"/>
+              </a:rPr>
+              <a:t>The `</a:t>
+            </a:r>
+            <a:r>
+              <a:rPr lang="en-US" b="1" dirty="0" err="1">
+                <a:solidFill>
+                  <a:srgbClr val="D83B01"/>
+                </a:solidFill>
+                <a:latin typeface="Segoe UI Semibold"/>
               </a:rPr>
               <a:t>ExecuteFunction</a:t>
             </a:r>
             <a:r>
-              <a:rPr lang="en-US" sz="900" dirty="0">
-                <a:solidFill>
-                  <a:srgbClr val="2F2F2F"/>
-                </a:solidFill>
-              </a:rPr>
-              <a:t> is an action that allows an add-in command to execute some script in the background without display any UI. This type of command requires a </a:t>
-            </a:r>
-            <a:r>
-              <a:rPr lang="en-US" sz="900" dirty="0" err="1">
-                <a:solidFill>
-                  <a:srgbClr val="2F2F2F"/>
-                </a:solidFill>
+              <a:rPr lang="en-US" b="1" dirty="0">
+                <a:solidFill>
+                  <a:srgbClr val="D83B01"/>
+                </a:solidFill>
+                <a:latin typeface="Segoe UI Semibold"/>
+              </a:rPr>
+              <a:t>` action allows an add-in command to execute some script in the background without displaying any UI. This type of command requires a `</a:t>
+            </a:r>
+            <a:r>
+              <a:rPr lang="en-US" b="1" dirty="0" err="1">
+                <a:solidFill>
+                  <a:srgbClr val="D83B01"/>
+                </a:solidFill>
+                <a:latin typeface="Segoe UI Semibold"/>
               </a:rPr>
               <a:t>FunctionFile</a:t>
             </a:r>
             <a:r>
-              <a:rPr lang="en-US" sz="900" dirty="0">
-                <a:solidFill>
-                  <a:srgbClr val="2F2F2F"/>
-                </a:solidFill>
-              </a:rPr>
-              <a:t> to be defined in the manifest that points to an HTML/JavaScript file</a:t>
-            </a:r>
+              <a:rPr lang="en-US" b="1" dirty="0">
+                <a:solidFill>
+                  <a:srgbClr val="D83B01"/>
+                </a:solidFill>
+                <a:latin typeface="Segoe UI Semibold"/>
+              </a:rPr>
+              <a:t>` to be defined in the manifest.</a:t>
+            </a:r>
+            <a:endParaRPr lang="en-US" sz="900" dirty="0">
+              <a:solidFill>
+                <a:srgbClr val="2F2F2F"/>
+              </a:solidFill>
+            </a:endParaRPr>
           </a:p>
         </p:txBody>
       </p:sp>
@@ -2794,7 +2981,7 @@
                 <a:tabLst/>
                 <a:defRPr/>
               </a:pPr>
-              <a:t>3/3/20 9:06 PM</a:t>
+              <a:t>4/7/20 4:06 PM</a:t>
             </a:fld>
             <a:endParaRPr kumimoji="0" lang="en-US" sz="1200" b="0" i="0" u="none" strike="noStrike" kern="1200" cap="none" spc="0" normalizeH="0" baseline="0" noProof="0" dirty="0">
               <a:ln>
@@ -2955,43 +3142,25 @@
           <a:p>
             <a:r>
               <a:rPr lang="en-US" dirty="0"/>
-              <a:t>I know this is an eye-chart, but I wanted to highlight how the manifest can be used to extent the Office ribbon.</a:t>
-            </a:r>
-          </a:p>
-          <a:p>
-            <a:pPr marL="171450" indent="-171450">
-              <a:buFont typeface="Arial" panose="020B0604020202020204" pitchFamily="34" charset="0"/>
-              <a:buChar char="•"/>
-            </a:pPr>
-            <a:r>
-              <a:rPr lang="en-US" dirty="0"/>
-              <a:t>The portion of manifest shown defined on </a:t>
-            </a:r>
-            <a:r>
-              <a:rPr lang="en-US" dirty="0" err="1"/>
-              <a:t>ExtentionPoint</a:t>
-            </a:r>
-            <a:r>
-              <a:rPr lang="en-US" dirty="0"/>
-              <a:t> of type </a:t>
-            </a:r>
-            <a:r>
-              <a:rPr lang="en-US" dirty="0" err="1"/>
-              <a:t>PrimaryCommandSurface</a:t>
-            </a:r>
-            <a:r>
-              <a:rPr lang="en-US" dirty="0"/>
-              <a:t>, which means the ribbon.</a:t>
-            </a:r>
-          </a:p>
-          <a:p>
-            <a:pPr marL="171450" indent="-171450">
-              <a:buFont typeface="Arial" panose="020B0604020202020204" pitchFamily="34" charset="0"/>
-              <a:buChar char="•"/>
-            </a:pPr>
-            <a:r>
-              <a:rPr lang="en-US" dirty="0"/>
-              <a:t>Within the </a:t>
+              <a:t>Let's explore how the different elements in the add-in manifest map to the rendered elements in the Outlook user experience.</a:t>
+            </a:r>
+          </a:p>
+          <a:p>
+            <a:endParaRPr lang="en-US" dirty="0"/>
+          </a:p>
+          <a:p>
+            <a:r>
+              <a:rPr lang="en-US" dirty="0"/>
+              <a:t>The following image includes contains an image of an Office client application on the left and a condensed version of an add-in manifest file on the right:</a:t>
+            </a:r>
+          </a:p>
+          <a:p>
+            <a:endParaRPr lang="en-US" dirty="0"/>
+          </a:p>
+          <a:p>
+            <a:r>
+              <a:rPr lang="en-US" dirty="0"/>
+              <a:t>The manifest starts with the `</a:t>
             </a:r>
             <a:r>
               <a:rPr lang="en-US" dirty="0" err="1"/>
@@ -2999,44 +3168,63 @@
             </a:r>
             <a:r>
               <a:rPr lang="en-US" dirty="0"/>
-              <a:t> the </a:t>
-            </a:r>
-            <a:r>
-              <a:rPr lang="en-US" dirty="0" err="1"/>
-              <a:t>CustomTab</a:t>
-            </a:r>
-            <a:r>
-              <a:rPr lang="en-US" dirty="0"/>
-              <a:t> element is used, which means the add-in will have it’s own custom tab. To extend an existing tab, the </a:t>
-            </a:r>
-            <a:r>
-              <a:rPr lang="en-US" dirty="0" err="1"/>
-              <a:t>OfficeTab</a:t>
-            </a:r>
-            <a:r>
-              <a:rPr lang="en-US" dirty="0"/>
-              <a:t> element would be used</a:t>
-            </a:r>
-          </a:p>
-          <a:p>
-            <a:pPr marL="171450" indent="-171450">
-              <a:buFont typeface="Arial" panose="020B0604020202020204" pitchFamily="34" charset="0"/>
-              <a:buChar char="•"/>
-            </a:pPr>
-            <a:r>
-              <a:rPr lang="en-US" dirty="0"/>
-              <a:t>The custom tab has one group containing three root controls…two buttons and menu.</a:t>
-            </a:r>
-          </a:p>
-          <a:p>
-            <a:pPr marL="171450" indent="-171450">
-              <a:buFont typeface="Arial" panose="020B0604020202020204" pitchFamily="34" charset="0"/>
-              <a:buChar char="•"/>
-            </a:pPr>
-            <a:r>
-              <a:rPr lang="en-US" dirty="0"/>
-              <a:t>The menu contains two buttons of its own</a:t>
-            </a:r>
+              <a:t>` element that contains all customizations defined for the Office ribbon:</a:t>
+            </a:r>
+          </a:p>
+          <a:p>
+            <a:endParaRPr lang="en-US" dirty="0"/>
+          </a:p>
+          <a:p>
+            <a:r>
+              <a:rPr lang="en-US" dirty="0"/>
+              <a:t>The entire contents of the `</a:t>
+            </a:r>
+            <a:r>
+              <a:rPr lang="en-US" dirty="0" err="1"/>
+              <a:t>ExtensionPoint</a:t>
+            </a:r>
+            <a:r>
+              <a:rPr lang="en-US" dirty="0"/>
+              <a:t>` element define the custom tab in the ribbon and all buttons in the tab:</a:t>
+            </a:r>
+          </a:p>
+          <a:p>
+            <a:endParaRPr lang="en-US" dirty="0"/>
+          </a:p>
+          <a:p>
+            <a:r>
+              <a:rPr lang="en-US" dirty="0"/>
+              <a:t>Each button in the ribbon is defined using a `Control` element. A control can be different types, defined in the `</a:t>
+            </a:r>
+            <a:r>
+              <a:rPr lang="en-US" dirty="0" err="1"/>
+              <a:t>xsi:type</a:t>
+            </a:r>
+            <a:r>
+              <a:rPr lang="en-US" dirty="0"/>
+              <a:t>` property. All the controls in this ribbon are buttons:</a:t>
+            </a:r>
+          </a:p>
+          <a:p>
+            <a:endParaRPr lang="en-US" dirty="0"/>
+          </a:p>
+          <a:p>
+            <a:r>
+              <a:rPr lang="en-US" dirty="0"/>
+              <a:t>Within a control, developers can define *actions* or *items*. An `Action` element is used to do an action, such as showing a task pane or executing a custom function.</a:t>
+            </a:r>
+          </a:p>
+          <a:p>
+            <a:endParaRPr lang="en-US" dirty="0"/>
+          </a:p>
+          <a:p>
+            <a:r>
+              <a:rPr lang="en-US" dirty="0"/>
+              <a:t>The `Items` collection allows developers to add additional menu items to the ribbon button as shown in the following image. Notice each sub menu item also has a `Action` element as well:</a:t>
+            </a:r>
+          </a:p>
+          <a:p>
+            <a:endParaRPr lang="en-US" dirty="0"/>
           </a:p>
         </p:txBody>
       </p:sp>
@@ -3130,7 +3318,7 @@
           <a:p>
             <a:fld id="{D18B56EA-E28F-4F92-9F16-7A6F2501B303}" type="datetime8">
               <a:rPr lang="en-US" smtClean="0"/>
-              <a:t>3/3/20 9:06 PM</a:t>
+              <a:t>4/7/20 4:07 PM</a:t>
             </a:fld>
             <a:endParaRPr lang="en-US" dirty="0"/>
           </a:p>
@@ -3223,7 +3411,7 @@
             </a:pPr>
             <a:r>
               <a:rPr lang="en-US" dirty="0"/>
-              <a:t>I wanted to show an example using an </a:t>
+              <a:t>The `</a:t>
             </a:r>
             <a:r>
               <a:rPr lang="en-US" dirty="0" err="1"/>
@@ -3231,45 +3419,49 @@
             </a:r>
             <a:r>
               <a:rPr lang="en-US" dirty="0"/>
-              <a:t> add-in command. This type of commend has three parts</a:t>
-            </a:r>
-          </a:p>
-          <a:p>
-            <a:pPr marL="228600" indent="-228600">
-              <a:buFont typeface="+mj-lt"/>
-              <a:buAutoNum type="arabicPeriod"/>
+              <a:t>` add-in command action enables developers to create custom functions, defined in JavaScript, to execute when a button is selected in the ribbon.</a:t>
+            </a:r>
+          </a:p>
+          <a:p>
+            <a:pPr marL="0" indent="0">
+              <a:buFont typeface="Arial" panose="020B0604020202020204" pitchFamily="34" charset="0"/>
+              <a:buNone/>
             </a:pPr>
-            <a:r>
-              <a:rPr lang="en-US" dirty="0"/>
-              <a:t>You need a function file, which is an HTML page with a script block. That script block MUST call </a:t>
-            </a:r>
-            <a:r>
-              <a:rPr lang="en-US" dirty="0" err="1"/>
-              <a:t>Office.initialize</a:t>
-            </a:r>
-            <a:r>
-              <a:rPr lang="en-US" dirty="0"/>
-              <a:t> and should globally expose any functions you want to call from a command button.</a:t>
-            </a:r>
-          </a:p>
-          <a:p>
-            <a:pPr marL="228600" indent="-228600">
-              <a:buFont typeface="+mj-lt"/>
-              <a:buAutoNum type="arabicPeriod"/>
+            <a:endParaRPr lang="en-US" dirty="0"/>
+          </a:p>
+          <a:p>
+            <a:pPr marL="0" indent="0">
+              <a:buFont typeface="Arial" panose="020B0604020202020204" pitchFamily="34" charset="0"/>
+              <a:buNone/>
             </a:pPr>
             <a:r>
               <a:rPr lang="en-US" dirty="0"/>
-              <a:t>You need to define that function file in the add-in manifest</a:t>
-            </a:r>
-          </a:p>
-          <a:p>
-            <a:pPr marL="228600" indent="-228600">
-              <a:buFont typeface="+mj-lt"/>
-              <a:buAutoNum type="arabicPeriod"/>
+              <a:t>First, define the function in a script file. For example, add the following code to a new file in your add-in named **</a:t>
+            </a:r>
+            <a:r>
+              <a:rPr lang="en-US" dirty="0" err="1"/>
+              <a:t>fnFile.html</a:t>
+            </a:r>
+            <a:r>
+              <a:rPr lang="en-US" dirty="0"/>
+              <a:t>**:</a:t>
+            </a:r>
+          </a:p>
+          <a:p>
+            <a:pPr marL="0" indent="0">
+              <a:buFont typeface="Arial" panose="020B0604020202020204" pitchFamily="34" charset="0"/>
+              <a:buNone/>
             </a:pPr>
-            <a:r>
-              <a:rPr lang="en-US" dirty="0"/>
-              <a:t>You need button with an action of type </a:t>
+            <a:endParaRPr lang="en-US" dirty="0"/>
+          </a:p>
+          <a:p>
+            <a:pPr marL="0" indent="0">
+              <a:buFont typeface="Arial" panose="020B0604020202020204" pitchFamily="34" charset="0"/>
+              <a:buNone/>
+            </a:pPr>
+            <a:r>
+              <a:rPr lang="en-US" dirty="0"/>
+              <a:t>To call the function, use the `</a:t>
             </a:r>
             <a:r>
               <a:rPr lang="en-US" dirty="0" err="1"/>
@@ -3277,15 +3469,7 @@
             </a:r>
             <a:r>
               <a:rPr lang="en-US" dirty="0"/>
-              <a:t> with a </a:t>
-            </a:r>
-            <a:r>
-              <a:rPr lang="en-US" dirty="0" err="1"/>
-              <a:t>FunctionName</a:t>
-            </a:r>
-            <a:r>
-              <a:rPr lang="en-US" dirty="0"/>
-              <a:t> pointing to the global function you want it to invoke.</a:t>
+              <a:t>` action type in the add-in manifest to call the function when the custom button is selected:</a:t>
             </a:r>
           </a:p>
         </p:txBody>
@@ -3380,7 +3564,7 @@
           <a:p>
             <a:fld id="{D18B56EA-E28F-4F92-9F16-7A6F2501B303}" type="datetime8">
               <a:rPr lang="en-US" smtClean="0"/>
-              <a:t>3/3/20 9:06 PM</a:t>
+              <a:t>4/7/20 4:07 PM</a:t>
             </a:fld>
             <a:endParaRPr lang="en-US" dirty="0"/>
           </a:p>
@@ -3469,7 +3653,7 @@
           <a:p>
             <a:r>
               <a:rPr lang="en-US" dirty="0"/>
-              <a:t>The Dialog API is and extension of the user experience you can customize in Office. You can use it to open dialogs from your add-in that interact with the user and your main add-in UX.</a:t>
+              <a:t>The Dialog API is an extension of the user experience developers can customize in Office. Developers can use it to open dialogs from custom add-ins that interact with the user and the custom add-in user experience.</a:t>
             </a:r>
           </a:p>
           <a:p>
@@ -3478,31 +3662,7 @@
           <a:p>
             <a:r>
               <a:rPr lang="en-US" dirty="0"/>
-              <a:t>The primary scenario for the dialog API is authentication with 3</a:t>
-            </a:r>
-            <a:r>
-              <a:rPr lang="en-US" baseline="30000" dirty="0"/>
-              <a:t>rd</a:t>
-            </a:r>
-            <a:r>
-              <a:rPr lang="en-US" dirty="0"/>
-              <a:t> party providers. Most identity providers prevent their sign-in experiences from being displayed in an </a:t>
-            </a:r>
-            <a:r>
-              <a:rPr lang="en-US" dirty="0" err="1"/>
-              <a:t>iframe</a:t>
-            </a:r>
-            <a:r>
-              <a:rPr lang="en-US" dirty="0"/>
-              <a:t> due to click-jacking concerns. This is troublesome with an add-in as they are displayed in </a:t>
-            </a:r>
-            <a:r>
-              <a:rPr lang="en-US" dirty="0" err="1"/>
-              <a:t>iframes</a:t>
-            </a:r>
-            <a:r>
-              <a:rPr lang="en-US" dirty="0"/>
-              <a:t> in some of the clients such as Office Online. Another challenge with authentication scenarios is predicting the domains that will need to load. In federated sign-in scenarios the potential list of domains could be endless, which again is troublesome in an add-in where all domains need to be registered in the manifest.</a:t>
+              <a:t>The primary scenario for the Dialog API is authentication with third-party providers. Most identity providers prevent their sign-in experiences from being displayed in an Iframe due to click-jacking concerns. This is troublesome with an add-in as they are displayed in Iframes in some of the clients such as the web versions of Office client applications.</a:t>
             </a:r>
           </a:p>
           <a:p>
@@ -3511,71 +3671,35 @@
           <a:p>
             <a:r>
               <a:rPr lang="en-US" dirty="0"/>
-              <a:t>It is important to note that Office offers a single sign-on experience specific for Microsoft identities. So if you </a:t>
-            </a:r>
-            <a:r>
-              <a:rPr lang="en-US" sz="900" b="0" i="0" kern="1200" dirty="0">
-                <a:solidFill>
-                  <a:schemeClr val="tx1"/>
-                </a:solidFill>
-                <a:effectLst/>
-                <a:latin typeface="Segoe UI Light" pitchFamily="34" charset="0"/>
-                <a:ea typeface="+mn-ea"/>
-                <a:cs typeface="+mn-cs"/>
-              </a:rPr>
-              <a:t>add-in requires data about the Office user or their resources accessible through Microsoft Graph, such as Office 365 or OneDrive, we recommend that you use the single sign-on API whenever you can. If you use the APIs for single sign-on, then you will not need the Dialog API.</a:t>
-            </a:r>
-          </a:p>
-          <a:p>
-            <a:endParaRPr lang="en-US" sz="900" b="0" i="0" kern="1200" dirty="0">
-              <a:solidFill>
-                <a:schemeClr val="tx1"/>
-              </a:solidFill>
-              <a:effectLst/>
-              <a:latin typeface="Segoe UI Light" pitchFamily="34" charset="0"/>
-              <a:ea typeface="+mn-ea"/>
-              <a:cs typeface="+mn-cs"/>
-            </a:endParaRPr>
-          </a:p>
-          <a:p>
-            <a:r>
-              <a:rPr lang="en-US" sz="900" b="0" i="0" kern="1200" dirty="0">
-                <a:solidFill>
-                  <a:schemeClr val="tx1"/>
-                </a:solidFill>
-                <a:effectLst/>
-                <a:latin typeface="Segoe UI Light" pitchFamily="34" charset="0"/>
-                <a:ea typeface="+mn-ea"/>
-                <a:cs typeface="+mn-cs"/>
-              </a:rPr>
-              <a:t>Beyond authentication, the dialog API can provide additional screen real estate for elements difficult to display in a traditional task pane of content add-in. A good example would be hosting a video that would be too small if confined to a task pane</a:t>
-            </a:r>
-          </a:p>
-          <a:p>
-            <a:endParaRPr lang="en-US" sz="900" b="0" i="0" kern="1200" dirty="0">
-              <a:solidFill>
-                <a:schemeClr val="tx1"/>
-              </a:solidFill>
-              <a:effectLst/>
-              <a:latin typeface="Segoe UI Light" pitchFamily="34" charset="0"/>
-              <a:ea typeface="+mn-ea"/>
-              <a:cs typeface="+mn-cs"/>
-            </a:endParaRPr>
-          </a:p>
-          <a:p>
-            <a:r>
-              <a:rPr lang="en-US" sz="900" b="0" i="0" kern="1200" dirty="0">
-                <a:solidFill>
-                  <a:schemeClr val="tx1"/>
-                </a:solidFill>
-                <a:effectLst/>
-                <a:latin typeface="Segoe UI Light" pitchFamily="34" charset="0"/>
-                <a:ea typeface="+mn-ea"/>
-                <a:cs typeface="+mn-cs"/>
-              </a:rPr>
-              <a:t>As suggested when I mentioned federated scenarios…the dialog API can display ANY https webpage, but you must launch it to an app domain first and then redirect.</a:t>
-            </a:r>
+              <a:t>Another challenge with authentication scenarios is predicting the domains that will need to load. In federated sign-in scenarios the potential list of domains could be endless, which again is troublesome in an add-in where all domains need to be registered in the manifest.</a:t>
+            </a:r>
+          </a:p>
+          <a:p>
             <a:endParaRPr lang="en-US" dirty="0"/>
+          </a:p>
+          <a:p>
+            <a:r>
+              <a:rPr lang="en-US" dirty="0"/>
+              <a:t>It's important to note that Office offers a single sign-on experience specific for Microsoft identities. If your add-in requires data about the Office user or their resources accessible through Microsoft Graph, such as Office 365 or OneDrive, Microsoft recommends you use the single sign-on API whenever you can. If you use the APIs for single sign-on, then you won't need the Dialog API.</a:t>
+            </a:r>
+          </a:p>
+          <a:p>
+            <a:endParaRPr lang="en-US" dirty="0"/>
+          </a:p>
+          <a:p>
+            <a:r>
+              <a:rPr lang="en-US" dirty="0"/>
+              <a:t>Beyond authentication, the Dialog API can provide additional screen real estate for elements difficult to display in a traditional task pane of content add-in. A good example would be hosting a video that would be too small if confined to a task pane</a:t>
+            </a:r>
+          </a:p>
+          <a:p>
+            <a:endParaRPr lang="en-US" dirty="0"/>
+          </a:p>
+          <a:p>
+            <a:r>
+              <a:rPr lang="en-US" dirty="0"/>
+              <a:t>The Dialog API can display any HTTPS web page, but it must be launched to an app domain first and then redirect.</a:t>
+            </a:r>
           </a:p>
         </p:txBody>
       </p:sp>
@@ -3669,7 +3793,7 @@
           <a:p>
             <a:fld id="{D18B56EA-E28F-4F92-9F16-7A6F2501B303}" type="datetime8">
               <a:rPr lang="en-US" smtClean="0"/>
-              <a:t>3/3/20 9:06 PM</a:t>
+              <a:t>4/7/20 4:08 PM</a:t>
             </a:fld>
             <a:endParaRPr lang="en-US" dirty="0"/>
           </a:p>
@@ -3758,40 +3882,56 @@
           <a:p>
             <a:r>
               <a:rPr lang="en-US" dirty="0"/>
-              <a:t>Here is the script used to display a dialog from an Office add-in. Notice it takes three parameters:</a:t>
-            </a:r>
-          </a:p>
-          <a:p>
-            <a:pPr marL="171450" indent="-171450">
-              <a:buFont typeface="Arial" panose="020B0604020202020204" pitchFamily="34" charset="0"/>
-              <a:buChar char="•"/>
-            </a:pPr>
-            <a:r>
-              <a:rPr lang="en-US" dirty="0"/>
-              <a:t>The URL is the page you want displayed in the dialog…it most initially be a page hosted from an app domain as defined in the manifest. However, you can immediately redirect to a different page.</a:t>
-            </a:r>
-          </a:p>
-          <a:p>
-            <a:pPr marL="171450" marR="0" lvl="0" indent="-171450" algn="l" defTabSz="932742" rtl="0" eaLnBrk="1" fontAlgn="auto" latinLnBrk="0" hangingPunct="1">
-              <a:lnSpc>
-                <a:spcPct val="90000"/>
-              </a:lnSpc>
-              <a:spcBef>
-                <a:spcPts val="0"/>
-              </a:spcBef>
-              <a:spcAft>
-                <a:spcPts val="340"/>
-              </a:spcAft>
-              <a:buClrTx/>
-              <a:buSzTx/>
-              <a:buFont typeface="Arial" panose="020B0604020202020204" pitchFamily="34" charset="0"/>
-              <a:buChar char="•"/>
-              <a:tabLst/>
-              <a:defRPr/>
-            </a:pPr>
-            <a:r>
-              <a:rPr lang="en-US" dirty="0"/>
-              <a:t>The options parameter allows the developer the modify the size of the dialog. By default, the dialog will display as 80% of the height and width of the device screen. The values for height and width are expressed that way…as % of the device screen. You can also optionally set the </a:t>
+              <a:t>Open a dialog using the `</a:t>
+            </a:r>
+            <a:r>
+              <a:rPr lang="en-US" dirty="0" err="1"/>
+              <a:t>diaplayDialogAsync</a:t>
+            </a:r>
+            <a:r>
+              <a:rPr lang="en-US" dirty="0"/>
+              <a:t>()` method from an Office add-in:</a:t>
+            </a:r>
+          </a:p>
+          <a:p>
+            <a:endParaRPr lang="en-US" dirty="0"/>
+          </a:p>
+          <a:p>
+            <a:r>
+              <a:rPr lang="en-US" dirty="0"/>
+              <a:t>The `</a:t>
+            </a:r>
+            <a:r>
+              <a:rPr lang="en-US" dirty="0" err="1"/>
+              <a:t>displayDialogAsync</a:t>
+            </a:r>
+            <a:r>
+              <a:rPr lang="en-US" dirty="0"/>
+              <a:t>()` method accepts three parameters:</a:t>
+            </a:r>
+          </a:p>
+          <a:p>
+            <a:endParaRPr lang="en-US" dirty="0"/>
+          </a:p>
+          <a:p>
+            <a:r>
+              <a:rPr lang="en-US" dirty="0"/>
+              <a:t>- The `&lt;URL /&gt;` is the page to be displayed in the dialog. It most initially is a page hosted from an app domain as defined in the manifest. However, the page can immediately redirect to a different page.</a:t>
+            </a:r>
+          </a:p>
+          <a:p>
+            <a:r>
+              <a:rPr lang="en-US" dirty="0"/>
+              <a:t>- The `options` parameter allows the developer to modify the size of the dialog. By default, the dialog will display as 80% of the height and width of the device screen. The values for height and width are expressed as percentage of the device screen.</a:t>
+            </a:r>
+          </a:p>
+          <a:p>
+            <a:endParaRPr lang="en-US" dirty="0"/>
+          </a:p>
+          <a:p>
+            <a:r>
+              <a:rPr lang="en-US" dirty="0"/>
+              <a:t>    Developers can optionally set the `</a:t>
             </a:r>
             <a:r>
               <a:rPr lang="en-US" dirty="0" err="1"/>
@@ -3799,46 +3939,24 @@
             </a:r>
             <a:r>
               <a:rPr lang="en-US" dirty="0"/>
-              <a:t> property in the options. Setting this to true will cause the dialog </a:t>
-            </a:r>
-            <a:r>
-              <a:rPr lang="en-US" b="0" dirty="0">
-                <a:solidFill>
-                  <a:srgbClr val="2F2F2F"/>
-                </a:solidFill>
-              </a:rPr>
-              <a:t>to display as a floating </a:t>
-            </a:r>
-            <a:r>
-              <a:rPr lang="en-US" b="0" dirty="0" err="1">
-                <a:solidFill>
-                  <a:srgbClr val="2F2F2F"/>
-                </a:solidFill>
-              </a:rPr>
-              <a:t>iframe</a:t>
-            </a:r>
-            <a:r>
-              <a:rPr lang="en-US" b="0" dirty="0">
-                <a:solidFill>
-                  <a:srgbClr val="2F2F2F"/>
-                </a:solidFill>
-              </a:rPr>
-              <a:t> rather than an independent window (in clients that support this), which makes it open faster.</a:t>
-            </a:r>
-            <a:endParaRPr lang="en-US" b="0" dirty="0">
-              <a:solidFill>
-                <a:srgbClr val="000A18"/>
-              </a:solidFill>
-            </a:endParaRPr>
-          </a:p>
-          <a:p>
-            <a:pPr marL="171450" indent="-171450">
-              <a:buFont typeface="Arial" panose="020B0604020202020204" pitchFamily="34" charset="0"/>
-              <a:buChar char="•"/>
-            </a:pPr>
-            <a:r>
-              <a:rPr lang="en-US" dirty="0"/>
-              <a:t>The optional callback allows you host page to respond to messages and events from the dialog…we will look into that more next.</a:t>
+              <a:t>` property in the options. Setting this to `true` will cause the dialog to display as a floating Iframe rather than an independent window (in clients that support this), which makes it open faster.</a:t>
+            </a:r>
+          </a:p>
+          <a:p>
+            <a:endParaRPr lang="en-US" dirty="0"/>
+          </a:p>
+          <a:p>
+            <a:r>
+              <a:rPr lang="en-US" dirty="0"/>
+              <a:t>- The `</a:t>
+            </a:r>
+            <a:r>
+              <a:rPr lang="en-US" dirty="0" err="1"/>
+              <a:t>optionalCallback</a:t>
+            </a:r>
+            <a:r>
+              <a:rPr lang="en-US" dirty="0"/>
+              <a:t>` allows the add-in's host page to respond to messages and events from the dialog.</a:t>
             </a:r>
           </a:p>
         </p:txBody>
@@ -3933,7 +4051,7 @@
           <a:p>
             <a:fld id="{D18B56EA-E28F-4F92-9F16-7A6F2501B303}" type="datetime8">
               <a:rPr lang="en-US" smtClean="0"/>
-              <a:t>3/3/20 9:06 PM</a:t>
+              <a:t>4/7/20 4:08 PM</a:t>
             </a:fld>
             <a:endParaRPr lang="en-US" dirty="0"/>
           </a:p>
@@ -4037,7 +4155,51 @@
                 <a:ea typeface="+mn-ea"/>
                 <a:cs typeface="+mn-cs"/>
               </a:rPr>
-              <a:t>Points of interest</a:t>
+              <a:t>The primary way to pass information to a dialog is through the browser's local storage (`</a:t>
+            </a:r>
+            <a:r>
+              <a:rPr lang="en-US" sz="800" b="1" kern="1200" dirty="0" err="1">
+                <a:solidFill>
+                  <a:schemeClr val="accent1"/>
+                </a:solidFill>
+                <a:latin typeface="Segoe UI Light" pitchFamily="34" charset="0"/>
+                <a:ea typeface="+mn-ea"/>
+                <a:cs typeface="+mn-cs"/>
+              </a:rPr>
+              <a:t>window.localStorage</a:t>
+            </a:r>
+            <a:r>
+              <a:rPr lang="en-US" sz="800" b="1" kern="1200" dirty="0">
+                <a:solidFill>
+                  <a:schemeClr val="accent1"/>
+                </a:solidFill>
+                <a:latin typeface="Segoe UI Light" pitchFamily="34" charset="0"/>
+                <a:ea typeface="+mn-ea"/>
+                <a:cs typeface="+mn-cs"/>
+              </a:rPr>
+              <a:t>`) or through URL parameters in the dialog URL. In this sample, the host page is passing an ID of "123" to the dialog via a </a:t>
+            </a:r>
+            <a:r>
+              <a:rPr lang="en-US" sz="800" b="1" kern="1200" dirty="0" err="1">
+                <a:solidFill>
+                  <a:schemeClr val="accent1"/>
+                </a:solidFill>
+                <a:latin typeface="Segoe UI Light" pitchFamily="34" charset="0"/>
+                <a:ea typeface="+mn-ea"/>
+                <a:cs typeface="+mn-cs"/>
+              </a:rPr>
+              <a:t>url</a:t>
+            </a:r>
+            <a:r>
+              <a:rPr lang="en-US" sz="800" b="1" kern="1200" dirty="0">
+                <a:solidFill>
+                  <a:schemeClr val="accent1"/>
+                </a:solidFill>
+                <a:latin typeface="Segoe UI Light" pitchFamily="34" charset="0"/>
+                <a:ea typeface="+mn-ea"/>
+                <a:cs typeface="+mn-cs"/>
+              </a:rPr>
+              <a:t> parameter.</a:t>
             </a:r>
           </a:p>
           <a:p>
@@ -4046,29 +4208,17 @@
                 <a:spcPct val="90000"/>
               </a:lnSpc>
               <a:spcBef>
-                <a:spcPts val="1200"/>
+                <a:spcPts val="600"/>
               </a:spcBef>
             </a:pPr>
-            <a:r>
-              <a:rPr lang="en-US" sz="900" dirty="0"/>
-              <a:t>The primary way to pass information to a dialog it through local storage (ex: </a:t>
-            </a:r>
-            <a:r>
-              <a:rPr lang="en-US" sz="900" dirty="0" err="1"/>
-              <a:t>window.localStorage</a:t>
-            </a:r>
-            <a:r>
-              <a:rPr lang="en-US" sz="900" dirty="0"/>
-              <a:t>) or through URL parameters in the dialog URL. In this sample, the host page is passing an id of “123” to the dialog via a </a:t>
-            </a:r>
-            <a:r>
-              <a:rPr lang="en-US" sz="900" dirty="0" err="1"/>
-              <a:t>url</a:t>
-            </a:r>
-            <a:r>
-              <a:rPr lang="en-US" sz="900" dirty="0"/>
-              <a:t> parameter.</a:t>
-            </a:r>
+            <a:endParaRPr lang="en-US" sz="800" b="1" kern="1200" dirty="0">
+              <a:solidFill>
+                <a:schemeClr val="accent1"/>
+              </a:solidFill>
+              <a:latin typeface="Segoe UI Light" pitchFamily="34" charset="0"/>
+              <a:ea typeface="+mn-ea"/>
+              <a:cs typeface="+mn-cs"/>
+            </a:endParaRPr>
           </a:p>
           <a:p>
             <a:pPr>
@@ -4076,24 +4226,24 @@
                 <a:spcPct val="90000"/>
               </a:lnSpc>
               <a:spcBef>
-                <a:spcPts val="1200"/>
+                <a:spcPts val="600"/>
               </a:spcBef>
             </a:pPr>
             <a:r>
-              <a:rPr lang="en-US" sz="900" kern="1200" dirty="0">
-                <a:solidFill>
-                  <a:schemeClr val="tx1"/>
+              <a:rPr lang="en-US" sz="800" b="1" kern="1200" dirty="0">
+                <a:solidFill>
+                  <a:schemeClr val="accent1"/>
                 </a:solidFill>
                 <a:latin typeface="Segoe UI Light" pitchFamily="34" charset="0"/>
                 <a:ea typeface="+mn-ea"/>
                 <a:cs typeface="+mn-cs"/>
               </a:rPr>
-              <a:t>A dialog can pass messages back to the host by calling </a:t>
-            </a:r>
-            <a:r>
-              <a:rPr lang="en-US" sz="900" kern="1200" dirty="0" err="1">
-                <a:solidFill>
-                  <a:schemeClr val="tx1"/>
+              <a:t>A dialog can pass messages back to the host by calling `</a:t>
+            </a:r>
+            <a:r>
+              <a:rPr lang="en-US" sz="800" b="1" kern="1200" dirty="0" err="1">
+                <a:solidFill>
+                  <a:schemeClr val="accent1"/>
                 </a:solidFill>
                 <a:latin typeface="Segoe UI Light" pitchFamily="34" charset="0"/>
                 <a:ea typeface="+mn-ea"/>
@@ -4102,37 +4252,15 @@
               <a:t>Office.context.ui.messageParent</a:t>
             </a:r>
             <a:r>
-              <a:rPr lang="en-US" sz="900" kern="1200" dirty="0">
-                <a:solidFill>
-                  <a:schemeClr val="tx1"/>
+              <a:rPr lang="en-US" sz="800" b="1" kern="1200" dirty="0">
+                <a:solidFill>
+                  <a:schemeClr val="accent1"/>
                 </a:solidFill>
                 <a:latin typeface="Segoe UI Light" pitchFamily="34" charset="0"/>
                 <a:ea typeface="+mn-ea"/>
                 <a:cs typeface="+mn-cs"/>
               </a:rPr>
-              <a:t> to send either a Boolean value or a string message (including </a:t>
-            </a:r>
-            <a:r>
-              <a:rPr lang="en-US" sz="900" kern="1200" dirty="0" err="1">
-                <a:solidFill>
-                  <a:schemeClr val="tx1"/>
-                </a:solidFill>
-                <a:latin typeface="Segoe UI Light" pitchFamily="34" charset="0"/>
-                <a:ea typeface="+mn-ea"/>
-                <a:cs typeface="+mn-cs"/>
-              </a:rPr>
-              <a:t>stringified</a:t>
-            </a:r>
-            <a:r>
-              <a:rPr lang="en-US" sz="900" kern="1200" dirty="0">
-                <a:solidFill>
-                  <a:schemeClr val="tx1"/>
-                </a:solidFill>
-                <a:latin typeface="Segoe UI Light" pitchFamily="34" charset="0"/>
-                <a:ea typeface="+mn-ea"/>
-                <a:cs typeface="+mn-cs"/>
-              </a:rPr>
-              <a:t> object) to the host page. At the bottom of the sample you can see the dialog script where it is passing the message “Hello from the dialog!!!” to the parent. </a:t>
+              <a:t>` to send either a Boolean value or a string message to the host page. At the bottom of the sample, you can see the dialog script where it's passing the message "Hello from the dialog!!!" to the parent.</a:t>
             </a:r>
           </a:p>
           <a:p>
@@ -4141,42 +4269,17 @@
                 <a:spcPct val="90000"/>
               </a:lnSpc>
               <a:spcBef>
-                <a:spcPts val="1200"/>
+                <a:spcPts val="600"/>
               </a:spcBef>
             </a:pPr>
-            <a:r>
-              <a:rPr lang="en-US" sz="900" kern="1200" dirty="0">
-                <a:solidFill>
-                  <a:schemeClr val="tx1"/>
-                </a:solidFill>
-                <a:latin typeface="Segoe UI Light" pitchFamily="34" charset="0"/>
-                <a:ea typeface="+mn-ea"/>
-                <a:cs typeface="+mn-cs"/>
-              </a:rPr>
-              <a:t>The </a:t>
-            </a:r>
-            <a:r>
-              <a:rPr lang="en-US" sz="900" kern="1200" dirty="0" err="1">
-                <a:solidFill>
-                  <a:schemeClr val="tx1"/>
-                </a:solidFill>
-                <a:latin typeface="Segoe UI Light" pitchFamily="34" charset="0"/>
-                <a:ea typeface="+mn-ea"/>
-                <a:cs typeface="+mn-cs"/>
-              </a:rPr>
-              <a:t>messageParent</a:t>
-            </a:r>
-            <a:r>
-              <a:rPr lang="en-US" sz="900" kern="1200" dirty="0">
-                <a:solidFill>
-                  <a:schemeClr val="tx1"/>
-                </a:solidFill>
-                <a:latin typeface="Segoe UI Light" pitchFamily="34" charset="0"/>
-                <a:ea typeface="+mn-ea"/>
-                <a:cs typeface="+mn-cs"/>
-              </a:rPr>
-              <a:t> function can only be called on a page with the same domain (including protocol and port) as the host page.</a:t>
-            </a:r>
+            <a:endParaRPr lang="en-US" sz="800" b="1" kern="1200" dirty="0">
+              <a:solidFill>
+                <a:schemeClr val="accent1"/>
+              </a:solidFill>
+              <a:latin typeface="Segoe UI Light" pitchFamily="34" charset="0"/>
+              <a:ea typeface="+mn-ea"/>
+              <a:cs typeface="+mn-cs"/>
+            </a:endParaRPr>
           </a:p>
           <a:p>
             <a:pPr>
@@ -4184,63 +4287,124 @@
                 <a:spcPct val="90000"/>
               </a:lnSpc>
               <a:spcBef>
-                <a:spcPts val="1200"/>
+                <a:spcPts val="600"/>
               </a:spcBef>
             </a:pPr>
             <a:r>
-              <a:rPr lang="en-US" sz="900" kern="1200" dirty="0">
-                <a:solidFill>
-                  <a:schemeClr val="tx1"/>
+              <a:rPr lang="en-US" sz="800" b="1" kern="1200" dirty="0">
+                <a:solidFill>
+                  <a:schemeClr val="accent1"/>
                 </a:solidFill>
                 <a:latin typeface="Segoe UI Light" pitchFamily="34" charset="0"/>
                 <a:ea typeface="+mn-ea"/>
                 <a:cs typeface="+mn-cs"/>
               </a:rPr>
-              <a:t>The host page must “listen” for messages by subscribing to the </a:t>
-            </a:r>
-            <a:r>
-              <a:rPr lang="en-US" sz="900" kern="1200" dirty="0" err="1">
-                <a:solidFill>
-                  <a:schemeClr val="tx1"/>
+              <a:t>The `</a:t>
+            </a:r>
+            <a:r>
+              <a:rPr lang="en-US" sz="800" b="1" kern="1200" dirty="0" err="1">
+                <a:solidFill>
+                  <a:schemeClr val="accent1"/>
                 </a:solidFill>
                 <a:latin typeface="Segoe UI Light" pitchFamily="34" charset="0"/>
                 <a:ea typeface="+mn-ea"/>
                 <a:cs typeface="+mn-cs"/>
               </a:rPr>
-              <a:t>DialogMessageReceived</a:t>
-            </a:r>
-            <a:r>
-              <a:rPr lang="en-US" sz="900" kern="1200" dirty="0">
-                <a:solidFill>
-                  <a:schemeClr val="tx1"/>
+              <a:t>messageParent</a:t>
+            </a:r>
+            <a:r>
+              <a:rPr lang="en-US" sz="800" b="1" kern="1200" dirty="0">
+                <a:solidFill>
+                  <a:schemeClr val="accent1"/>
                 </a:solidFill>
                 <a:latin typeface="Segoe UI Light" pitchFamily="34" charset="0"/>
                 <a:ea typeface="+mn-ea"/>
                 <a:cs typeface="+mn-cs"/>
               </a:rPr>
-              <a:t> handler. In the sample, the host page registers this handler using the </a:t>
-            </a:r>
-            <a:r>
-              <a:rPr lang="en-US" sz="900" kern="1200" dirty="0" err="1">
-                <a:solidFill>
-                  <a:schemeClr val="tx1"/>
+              <a:t>()` method can only be called on a page with the same domain (including protocol and port) as the host page.</a:t>
+            </a:r>
+          </a:p>
+          <a:p>
+            <a:pPr>
+              <a:lnSpc>
+                <a:spcPct val="90000"/>
+              </a:lnSpc>
+              <a:spcBef>
+                <a:spcPts val="600"/>
+              </a:spcBef>
+            </a:pPr>
+            <a:endParaRPr lang="en-US" sz="800" b="1" kern="1200" dirty="0">
+              <a:solidFill>
+                <a:schemeClr val="accent1"/>
+              </a:solidFill>
+              <a:latin typeface="Segoe UI Light" pitchFamily="34" charset="0"/>
+              <a:ea typeface="+mn-ea"/>
+              <a:cs typeface="+mn-cs"/>
+            </a:endParaRPr>
+          </a:p>
+          <a:p>
+            <a:pPr>
+              <a:lnSpc>
+                <a:spcPct val="90000"/>
+              </a:lnSpc>
+              <a:spcBef>
+                <a:spcPts val="600"/>
+              </a:spcBef>
+            </a:pPr>
+            <a:r>
+              <a:rPr lang="en-US" sz="800" b="1" kern="1200" dirty="0">
+                <a:solidFill>
+                  <a:schemeClr val="accent1"/>
                 </a:solidFill>
                 <a:latin typeface="Segoe UI Light" pitchFamily="34" charset="0"/>
                 <a:ea typeface="+mn-ea"/>
                 <a:cs typeface="+mn-cs"/>
               </a:rPr>
-              <a:t>processMessage</a:t>
-            </a:r>
-            <a:r>
-              <a:rPr lang="en-US" sz="900" kern="1200" dirty="0">
-                <a:solidFill>
-                  <a:schemeClr val="tx1"/>
+              <a:t>The host page must listen for messages by subscribing to the `</a:t>
+            </a:r>
+            <a:r>
+              <a:rPr lang="en-US" sz="800" b="1" kern="1200" dirty="0" err="1">
+                <a:solidFill>
+                  <a:schemeClr val="accent1"/>
                 </a:solidFill>
                 <a:latin typeface="Segoe UI Light" pitchFamily="34" charset="0"/>
                 <a:ea typeface="+mn-ea"/>
                 <a:cs typeface="+mn-cs"/>
               </a:rPr>
-              <a:t> function, where it simply logs the message.</a:t>
+              <a:t>DialogMessageReceived</a:t>
+            </a:r>
+            <a:r>
+              <a:rPr lang="en-US" sz="800" b="1" kern="1200" dirty="0">
+                <a:solidFill>
+                  <a:schemeClr val="accent1"/>
+                </a:solidFill>
+                <a:latin typeface="Segoe UI Light" pitchFamily="34" charset="0"/>
+                <a:ea typeface="+mn-ea"/>
+                <a:cs typeface="+mn-cs"/>
+              </a:rPr>
+              <a:t>` handler. In the sample, the host page registers this handler using the `</a:t>
+            </a:r>
+            <a:r>
+              <a:rPr lang="en-US" sz="800" b="1" kern="1200" dirty="0" err="1">
+                <a:solidFill>
+                  <a:schemeClr val="accent1"/>
+                </a:solidFill>
+                <a:latin typeface="Segoe UI Light" pitchFamily="34" charset="0"/>
+                <a:ea typeface="+mn-ea"/>
+                <a:cs typeface="+mn-cs"/>
+              </a:rPr>
+              <a:t>processMessage</a:t>
+            </a:r>
+            <a:r>
+              <a:rPr lang="en-US" sz="800" b="1" kern="1200" dirty="0">
+                <a:solidFill>
+                  <a:schemeClr val="accent1"/>
+                </a:solidFill>
+                <a:latin typeface="Segoe UI Light" pitchFamily="34" charset="0"/>
+                <a:ea typeface="+mn-ea"/>
+                <a:cs typeface="+mn-cs"/>
+              </a:rPr>
+              <a:t>` function, where it logs the message to the console.</a:t>
             </a:r>
             <a:endParaRPr lang="en-US" sz="800" kern="1200" dirty="0">
               <a:solidFill>
@@ -4343,7 +4507,7 @@
           <a:p>
             <a:fld id="{D18B56EA-E28F-4F92-9F16-7A6F2501B303}" type="datetime8">
               <a:rPr lang="en-US" smtClean="0"/>
-              <a:t>3/3/20 9:06 PM</a:t>
+              <a:t>4/7/20 4:09 PM</a:t>
             </a:fld>
             <a:endParaRPr lang="en-US" dirty="0"/>
           </a:p>
@@ -4590,7 +4754,7 @@
           <a:p>
             <a:fld id="{D18B56EA-E28F-4F92-9F16-7A6F2501B303}" type="datetime8">
               <a:rPr lang="en-US" smtClean="0"/>
-              <a:t>3/3/20 9:06 PM</a:t>
+              <a:t>4/7/20 3:27 PM</a:t>
             </a:fld>
             <a:endParaRPr lang="en-US" dirty="0"/>
           </a:p>

</xml_diff>

<commit_message>
FY21Q4 refresh - office-add-ins-outlook
- run through all exercise steps in associated MSLearn module to validate good working order
- updated steps & fixed typos where necessary
- updated slides where necessary
- update references to add-ins & OUIF to casing & references per PG feedback
- update code samples to reflect MSLearn HOL exercise refresh & updates
- any & all users/names/company names/pictures/IDs are not real people/tenants... all are from M365 demo tenants provided by Microsoft
</commit_message>
<xml_diff>
--- a/OfficeAddin/04 Building Add-ins for Microsoft Outlook/02 Add-in Commands and Dialogs.pptx
+++ b/OfficeAddin/04 Building Add-ins for Microsoft Outlook/02 Add-in Commands and Dialogs.pptx
@@ -265,7 +265,7 @@
               <a:rPr lang="en-US" smtClean="0">
                 <a:latin typeface="Segoe UI" pitchFamily="34" charset="0"/>
               </a:rPr>
-              <a:t>4/7/20 3:27 PM</a:t>
+              <a:t>6/17/21 11:40 AM</a:t>
             </a:fld>
             <a:endParaRPr lang="en-US" dirty="0">
               <a:latin typeface="Segoe UI" pitchFamily="34" charset="0"/>
@@ -559,7 +559,7 @@
           <a:p>
             <a:fld id="{D18B56EA-E28F-4F92-9F16-7A6F2501B303}" type="datetime8">
               <a:rPr lang="en-US" smtClean="0"/>
-              <a:t>4/7/20 3:27 PM</a:t>
+              <a:t>6/17/21 11:40 AM</a:t>
             </a:fld>
             <a:endParaRPr lang="en-US" dirty="0"/>
           </a:p>
@@ -1072,7 +1072,7 @@
                 <a:tabLst/>
                 <a:defRPr/>
               </a:pPr>
-              <a:t>4/7/20 4:03 PM</a:t>
+              <a:t>6/17/21 11:40 AM</a:t>
             </a:fld>
             <a:endParaRPr kumimoji="0" lang="en-US" sz="1200" b="0" i="0" u="none" strike="noStrike" kern="1200" cap="none" spc="0" normalizeH="0" baseline="0" noProof="0" dirty="0">
               <a:ln>
@@ -1325,7 +1325,7 @@
           <a:p>
             <a:fld id="{D18B56EA-E28F-4F92-9F16-7A6F2501B303}" type="datetime8">
               <a:rPr lang="en-US" smtClean="0"/>
-              <a:t>4/7/20 3:27 PM</a:t>
+              <a:t>6/17/21 11:40 AM</a:t>
             </a:fld>
             <a:endParaRPr lang="en-US" dirty="0"/>
           </a:p>
@@ -1506,7 +1506,7 @@
           <a:p>
             <a:fld id="{D18B56EA-E28F-4F92-9F16-7A6F2501B303}" type="datetime8">
               <a:rPr lang="en-US" smtClean="0"/>
-              <a:t>4/7/20 3:27 PM</a:t>
+              <a:t>6/17/21 11:40 AM</a:t>
             </a:fld>
             <a:endParaRPr lang="en-US" dirty="0"/>
           </a:p>
@@ -1687,7 +1687,7 @@
           <a:p>
             <a:fld id="{D18B56EA-E28F-4F92-9F16-7A6F2501B303}" type="datetime8">
               <a:rPr lang="en-US" smtClean="0"/>
-              <a:t>4/7/20 3:27 PM</a:t>
+              <a:t>6/17/21 11:40 AM</a:t>
             </a:fld>
             <a:endParaRPr lang="en-US" dirty="0"/>
           </a:p>
@@ -1868,7 +1868,7 @@
           <a:p>
             <a:fld id="{D18B56EA-E28F-4F92-9F16-7A6F2501B303}" type="datetime8">
               <a:rPr lang="en-US" smtClean="0"/>
-              <a:t>4/7/20 3:27 PM</a:t>
+              <a:t>6/17/21 11:40 AM</a:t>
             </a:fld>
             <a:endParaRPr lang="en-US" dirty="0"/>
           </a:p>
@@ -2160,7 +2160,7 @@
                 <a:tabLst/>
                 <a:defRPr/>
               </a:pPr>
-              <a:t>4/7/20 4:04 PM</a:t>
+              <a:t>6/17/21 11:40 AM</a:t>
             </a:fld>
             <a:endParaRPr kumimoji="0" lang="en-US" sz="1200" b="0" i="0" u="none" strike="noStrike" kern="1200" cap="none" spc="0" normalizeH="0" baseline="0" noProof="0" dirty="0">
               <a:ln>
@@ -2981,7 +2981,7 @@
                 <a:tabLst/>
                 <a:defRPr/>
               </a:pPr>
-              <a:t>4/7/20 4:06 PM</a:t>
+              <a:t>6/17/21 11:40 AM</a:t>
             </a:fld>
             <a:endParaRPr kumimoji="0" lang="en-US" sz="1200" b="0" i="0" u="none" strike="noStrike" kern="1200" cap="none" spc="0" normalizeH="0" baseline="0" noProof="0" dirty="0">
               <a:ln>
@@ -3318,7 +3318,7 @@
           <a:p>
             <a:fld id="{D18B56EA-E28F-4F92-9F16-7A6F2501B303}" type="datetime8">
               <a:rPr lang="en-US" smtClean="0"/>
-              <a:t>4/7/20 4:07 PM</a:t>
+              <a:t>6/17/21 11:40 AM</a:t>
             </a:fld>
             <a:endParaRPr lang="en-US" dirty="0"/>
           </a:p>
@@ -3564,7 +3564,7 @@
           <a:p>
             <a:fld id="{D18B56EA-E28F-4F92-9F16-7A6F2501B303}" type="datetime8">
               <a:rPr lang="en-US" smtClean="0"/>
-              <a:t>4/7/20 4:07 PM</a:t>
+              <a:t>6/17/21 11:40 AM</a:t>
             </a:fld>
             <a:endParaRPr lang="en-US" dirty="0"/>
           </a:p>
@@ -3793,7 +3793,7 @@
           <a:p>
             <a:fld id="{D18B56EA-E28F-4F92-9F16-7A6F2501B303}" type="datetime8">
               <a:rPr lang="en-US" smtClean="0"/>
-              <a:t>4/7/20 4:08 PM</a:t>
+              <a:t>6/17/21 11:40 AM</a:t>
             </a:fld>
             <a:endParaRPr lang="en-US" dirty="0"/>
           </a:p>
@@ -4051,7 +4051,7 @@
           <a:p>
             <a:fld id="{D18B56EA-E28F-4F92-9F16-7A6F2501B303}" type="datetime8">
               <a:rPr lang="en-US" smtClean="0"/>
-              <a:t>4/7/20 4:08 PM</a:t>
+              <a:t>6/17/21 11:40 AM</a:t>
             </a:fld>
             <a:endParaRPr lang="en-US" dirty="0"/>
           </a:p>
@@ -4507,7 +4507,7 @@
           <a:p>
             <a:fld id="{D18B56EA-E28F-4F92-9F16-7A6F2501B303}" type="datetime8">
               <a:rPr lang="en-US" smtClean="0"/>
-              <a:t>4/7/20 4:09 PM</a:t>
+              <a:t>6/17/21 11:40 AM</a:t>
             </a:fld>
             <a:endParaRPr lang="en-US" dirty="0"/>
           </a:p>
@@ -4754,7 +4754,7 @@
           <a:p>
             <a:fld id="{D18B56EA-E28F-4F92-9F16-7A6F2501B303}" type="datetime8">
               <a:rPr lang="en-US" smtClean="0"/>
-              <a:t>4/7/20 3:27 PM</a:t>
+              <a:t>6/17/21 11:40 AM</a:t>
             </a:fld>
             <a:endParaRPr lang="en-US" dirty="0"/>
           </a:p>
@@ -15630,34 +15630,20 @@
                 <a:solidFill>
                   <a:srgbClr val="2F2F2F"/>
                 </a:solidFill>
+                <a:latin typeface="Courier New" panose="02070309020205020404" pitchFamily="49" charset="0"/>
+                <a:cs typeface="Courier New" panose="02070309020205020404" pitchFamily="49" charset="0"/>
+              </a:rPr>
+              <a:t>ExecuteFunction</a:t>
+            </a:r>
+            <a:r>
+              <a:rPr lang="en-US" sz="1600" b="0" dirty="0">
+                <a:solidFill>
+                  <a:srgbClr val="2F2F2F"/>
+                </a:solidFill>
                 <a:latin typeface="Segoe UI Semibold"/>
               </a:rPr>
-              <a:t>ExecuteFunction</a:t>
-            </a:r>
-            <a:r>
-              <a:rPr lang="en-US" sz="1600" b="0" dirty="0">
-                <a:solidFill>
-                  <a:srgbClr val="2F2F2F"/>
-                </a:solidFill>
-                <a:latin typeface="Segoe UI Semibold"/>
-              </a:rPr>
-              <a:t> actions for operations that </a:t>
-            </a:r>
-            <a:r>
-              <a:rPr lang="en-US" sz="1600" b="0">
-                <a:solidFill>
-                  <a:srgbClr val="2F2F2F"/>
-                </a:solidFill>
-                <a:latin typeface="Segoe UI Semibold"/>
-              </a:rPr>
-              <a:t>don’t need a UI</a:t>
-            </a:r>
-            <a:endParaRPr lang="en-US" sz="1600" b="0" dirty="0">
-              <a:solidFill>
-                <a:srgbClr val="2F2F2F"/>
-              </a:solidFill>
-              <a:latin typeface="Segoe UI Semibold"/>
-            </a:endParaRPr>
+              <a:t> actions for operations that don’t need a UI</a:t>
+            </a:r>
           </a:p>
           <a:p>
             <a:pPr lvl="0">
@@ -16444,7 +16430,7 @@
                   <a:srgbClr val="D83B01"/>
                 </a:solidFill>
               </a:rPr>
-              <a:t>Add-in Commands</a:t>
+              <a:t>Add-in commands</a:t>
             </a:r>
           </a:p>
           <a:p>
@@ -16467,7 +16453,7 @@
                   <a:srgbClr val="D83B01"/>
                 </a:solidFill>
               </a:rPr>
-              <a:t> Actions</a:t>
+              <a:t> actions</a:t>
             </a:r>
           </a:p>
           <a:p>
@@ -16696,7 +16682,7 @@
         <p:spPr>
           <a:xfrm>
             <a:off x="465139" y="1500487"/>
-            <a:ext cx="11533186" cy="4391972"/>
+            <a:ext cx="11533186" cy="4779770"/>
           </a:xfrm>
           <a:prstGeom prst="rect">
             <a:avLst/>
@@ -16957,7 +16943,43 @@
                   <a:srgbClr val="2F2F2F"/>
                 </a:solidFill>
               </a:rPr>
-              <a:t>Add-in commands provide an easy way to customize the default Office user interface (UI) with specified UI elements that perform actions. </a:t>
+              <a:t>Add-in commands provide an easy way to customize the default Office user interface </a:t>
+            </a:r>
+            <a:r>
+              <a:rPr lang="en-US" sz="1600" dirty="0">
+                <a:solidFill>
+                  <a:srgbClr val="2F2F2F"/>
+                </a:solidFill>
+                <a:latin typeface="Segoe UI Symbol" panose="020B0502040204020203" pitchFamily="34" charset="0"/>
+                <a:ea typeface="Segoe UI Symbol" panose="020B0502040204020203" pitchFamily="34" charset="0"/>
+              </a:rPr>
+              <a:t>(</a:t>
+            </a:r>
+            <a:r>
+              <a:rPr lang="en-US" sz="1600" dirty="0">
+                <a:solidFill>
+                  <a:srgbClr val="2F2F2F"/>
+                </a:solidFill>
+              </a:rPr>
+              <a:t>UI</a:t>
+            </a:r>
+            <a:r>
+              <a:rPr lang="en-US" sz="1600" dirty="0">
+                <a:solidFill>
+                  <a:srgbClr val="2F2F2F"/>
+                </a:solidFill>
+                <a:latin typeface="Segoe UI Symbol" panose="020B0502040204020203" pitchFamily="34" charset="0"/>
+                <a:ea typeface="Segoe UI Symbol" panose="020B0502040204020203" pitchFamily="34" charset="0"/>
+              </a:rPr>
+              <a:t>)</a:t>
+            </a:r>
+            <a:r>
+              <a:rPr lang="en-US" sz="1600" dirty="0">
+                <a:solidFill>
+                  <a:srgbClr val="2F2F2F"/>
+                </a:solidFill>
+              </a:rPr>
+              <a:t> with specified UI elements that perform actions. </a:t>
             </a:r>
           </a:p>
           <a:p>
@@ -16982,6 +17004,8 @@
                 <a:solidFill>
                   <a:srgbClr val="2F2F2F"/>
                 </a:solidFill>
+                <a:latin typeface="Courier New" panose="02070309020205020404" pitchFamily="49" charset="0"/>
+                <a:cs typeface="Courier New" panose="02070309020205020404" pitchFamily="49" charset="0"/>
               </a:rPr>
               <a:t>VersionOverrides</a:t>
             </a:r>
@@ -16991,7 +17015,7 @@
                   <a:srgbClr val="2F2F2F"/>
                 </a:solidFill>
               </a:rPr>
-              <a:t> element of an Add-in manifest.</a:t>
+              <a:t> element of an add-in manifest.</a:t>
             </a:r>
           </a:p>
           <a:p>
@@ -17077,6 +17101,8 @@
                 <a:solidFill>
                   <a:srgbClr val="2F2F2F"/>
                 </a:solidFill>
+                <a:latin typeface="Courier New" panose="02070309020205020404" pitchFamily="49" charset="0"/>
+                <a:cs typeface="Courier New" panose="02070309020205020404" pitchFamily="49" charset="0"/>
               </a:rPr>
               <a:t>ExtensionPoint</a:t>
             </a:r>
@@ -17086,13 +17112,25 @@
                   <a:srgbClr val="2F2F2F"/>
                 </a:solidFill>
               </a:rPr>
-              <a:t> element defines where Add-in commands should appear in the Office UI, including in an existing ribbon tab (</a:t>
+              <a:t> element defines where add-in commands should appear in the Office UI, including in an existing ribbon tab </a:t>
+            </a:r>
+            <a:r>
+              <a:rPr lang="en-US" sz="1600" dirty="0">
+                <a:solidFill>
+                  <a:srgbClr val="2F2F2F"/>
+                </a:solidFill>
+                <a:latin typeface="Segoe UI Symbol" panose="020B0502040204020203" pitchFamily="34" charset="0"/>
+                <a:ea typeface="Segoe UI Symbol" panose="020B0502040204020203" pitchFamily="34" charset="0"/>
+              </a:rPr>
+              <a:t>(</a:t>
             </a:r>
             <a:r>
               <a:rPr lang="en-US" sz="1600" dirty="0" err="1">
                 <a:solidFill>
                   <a:srgbClr val="2F2F2F"/>
                 </a:solidFill>
+                <a:latin typeface="Courier New" panose="02070309020205020404" pitchFamily="49" charset="0"/>
+                <a:cs typeface="Courier New" panose="02070309020205020404" pitchFamily="49" charset="0"/>
               </a:rPr>
               <a:t>OfficeTab</a:t>
             </a:r>
@@ -17101,14 +17139,36 @@
                 <a:solidFill>
                   <a:srgbClr val="2F2F2F"/>
                 </a:solidFill>
-              </a:rPr>
-              <a:t>), a custom tab (</a:t>
+                <a:latin typeface="Segoe UI Symbol" panose="020B0502040204020203" pitchFamily="34" charset="0"/>
+                <a:ea typeface="Segoe UI Symbol" panose="020B0502040204020203" pitchFamily="34" charset="0"/>
+              </a:rPr>
+              <a:t>)</a:t>
+            </a:r>
+            <a:r>
+              <a:rPr lang="en-US" sz="1600" dirty="0">
+                <a:solidFill>
+                  <a:srgbClr val="2F2F2F"/>
+                </a:solidFill>
+              </a:rPr>
+              <a:t>, a custom tab </a:t>
+            </a:r>
+            <a:r>
+              <a:rPr lang="en-US" sz="1600" dirty="0">
+                <a:solidFill>
+                  <a:srgbClr val="2F2F2F"/>
+                </a:solidFill>
+                <a:latin typeface="Segoe UI Symbol" panose="020B0502040204020203" pitchFamily="34" charset="0"/>
+                <a:ea typeface="Segoe UI Symbol" panose="020B0502040204020203" pitchFamily="34" charset="0"/>
+              </a:rPr>
+              <a:t>(</a:t>
             </a:r>
             <a:r>
               <a:rPr lang="en-US" sz="1600" dirty="0" err="1">
                 <a:solidFill>
                   <a:srgbClr val="2F2F2F"/>
                 </a:solidFill>
+                <a:latin typeface="Courier New" panose="02070309020205020404" pitchFamily="49" charset="0"/>
+                <a:cs typeface="Courier New" panose="02070309020205020404" pitchFamily="49" charset="0"/>
               </a:rPr>
               <a:t>CustomTab</a:t>
             </a:r>
@@ -17117,14 +17177,36 @@
                 <a:solidFill>
                   <a:srgbClr val="2F2F2F"/>
                 </a:solidFill>
-              </a:rPr>
-              <a:t>), or in a context menu from right-clicking in the Office UI (</a:t>
+                <a:latin typeface="Segoe UI Symbol" panose="020B0502040204020203" pitchFamily="34" charset="0"/>
+                <a:ea typeface="Segoe UI Symbol" panose="020B0502040204020203" pitchFamily="34" charset="0"/>
+              </a:rPr>
+              <a:t>)</a:t>
+            </a:r>
+            <a:r>
+              <a:rPr lang="en-US" sz="1600" dirty="0">
+                <a:solidFill>
+                  <a:srgbClr val="2F2F2F"/>
+                </a:solidFill>
+              </a:rPr>
+              <a:t>, or in a context menu from right-clicking in the Office UI </a:t>
+            </a:r>
+            <a:r>
+              <a:rPr lang="en-US" sz="1600" dirty="0">
+                <a:solidFill>
+                  <a:srgbClr val="2F2F2F"/>
+                </a:solidFill>
+                <a:latin typeface="Segoe UI Symbol" panose="020B0502040204020203" pitchFamily="34" charset="0"/>
+                <a:ea typeface="Segoe UI Symbol" panose="020B0502040204020203" pitchFamily="34" charset="0"/>
+              </a:rPr>
+              <a:t>(</a:t>
             </a:r>
             <a:r>
               <a:rPr lang="en-US" sz="1600" dirty="0" err="1">
                 <a:solidFill>
                   <a:srgbClr val="2F2F2F"/>
                 </a:solidFill>
+                <a:latin typeface="Courier New" panose="02070309020205020404" pitchFamily="49" charset="0"/>
+                <a:cs typeface="Courier New" panose="02070309020205020404" pitchFamily="49" charset="0"/>
               </a:rPr>
               <a:t>OfficeMenu</a:t>
             </a:r>
@@ -17133,8 +17215,18 @@
                 <a:solidFill>
                   <a:srgbClr val="2F2F2F"/>
                 </a:solidFill>
-              </a:rPr>
-              <a:t>).</a:t>
+                <a:latin typeface="Segoe UI Symbol" panose="020B0502040204020203" pitchFamily="34" charset="0"/>
+                <a:ea typeface="Segoe UI Symbol" panose="020B0502040204020203" pitchFamily="34" charset="0"/>
+              </a:rPr>
+              <a:t>)</a:t>
+            </a:r>
+            <a:r>
+              <a:rPr lang="en-US" sz="1600" dirty="0">
+                <a:solidFill>
+                  <a:srgbClr val="2F2F2F"/>
+                </a:solidFill>
+              </a:rPr>
+              <a:t>.</a:t>
             </a:r>
           </a:p>
           <a:p>
@@ -17203,6 +17295,8 @@
                 <a:solidFill>
                   <a:srgbClr val="2F2F2F"/>
                 </a:solidFill>
+                <a:latin typeface="Courier New" panose="02070309020205020404" pitchFamily="49" charset="0"/>
+                <a:cs typeface="Courier New" panose="02070309020205020404" pitchFamily="49" charset="0"/>
               </a:rPr>
               <a:t>ShowTaskpane</a:t>
             </a:r>
@@ -17212,7 +17306,7 @@
                   <a:srgbClr val="2F2F2F"/>
                 </a:solidFill>
               </a:rPr>
-              <a:t> is the most common action for an add-in command. It is used to launch the Add-in in a task pane. Using an add-in command to launch an Add-in is considered a best practice and is incorporated in most Office Add-in templates/generators.</a:t>
+              <a:t> is the most common action for an add-in command. It is used to launch the add-in in a task pane. Using an add-in command to launch an add-in is considered a best practice and is incorporated in most Office Add-in templates/generators.</a:t>
             </a:r>
           </a:p>
           <a:p>
@@ -17229,6 +17323,8 @@
                 <a:solidFill>
                   <a:srgbClr val="2F2F2F"/>
                 </a:solidFill>
+                <a:latin typeface="Courier New" panose="02070309020205020404" pitchFamily="49" charset="0"/>
+                <a:cs typeface="Courier New" panose="02070309020205020404" pitchFamily="49" charset="0"/>
               </a:rPr>
               <a:t>ExecuteFunction</a:t>
             </a:r>
@@ -17245,6 +17341,8 @@
                 <a:solidFill>
                   <a:srgbClr val="2F2F2F"/>
                 </a:solidFill>
+                <a:latin typeface="Courier New" panose="02070309020205020404" pitchFamily="49" charset="0"/>
+                <a:cs typeface="Courier New" panose="02070309020205020404" pitchFamily="49" charset="0"/>
               </a:rPr>
               <a:t>FunctionFile</a:t>
             </a:r>
@@ -25777,7 +25875,43 @@
                   <a:srgbClr val="2F2F2F"/>
                 </a:solidFill>
               </a:rPr>
-              <a:t>The optional callback allows a host page (the page that opens the dialog) to listen for messages from dialog.</a:t>
+              <a:t>The optional callback allows a host page </a:t>
+            </a:r>
+            <a:r>
+              <a:rPr lang="en-US" b="0" dirty="0">
+                <a:solidFill>
+                  <a:srgbClr val="2F2F2F"/>
+                </a:solidFill>
+                <a:latin typeface="Segoe UI Symbol" panose="020B0502040204020203" pitchFamily="34" charset="0"/>
+                <a:ea typeface="Segoe UI Symbol" panose="020B0502040204020203" pitchFamily="34" charset="0"/>
+              </a:rPr>
+              <a:t>(</a:t>
+            </a:r>
+            <a:r>
+              <a:rPr lang="en-US" b="0" dirty="0">
+                <a:solidFill>
+                  <a:srgbClr val="2F2F2F"/>
+                </a:solidFill>
+              </a:rPr>
+              <a:t>the page that opens the dialog</a:t>
+            </a:r>
+            <a:r>
+              <a:rPr lang="en-US" b="0" dirty="0">
+                <a:solidFill>
+                  <a:srgbClr val="2F2F2F"/>
+                </a:solidFill>
+                <a:latin typeface="Segoe UI Symbol" panose="020B0502040204020203" pitchFamily="34" charset="0"/>
+                <a:ea typeface="Segoe UI Symbol" panose="020B0502040204020203" pitchFamily="34" charset="0"/>
+              </a:rPr>
+              <a:t>)</a:t>
+            </a:r>
+            <a:r>
+              <a:rPr lang="en-US" b="0" dirty="0">
+                <a:solidFill>
+                  <a:srgbClr val="2F2F2F"/>
+                </a:solidFill>
+              </a:rPr>
+              <a:t> to listen for messages from dialog.</a:t>
             </a:r>
             <a:endParaRPr lang="en-US" b="0" dirty="0">
               <a:solidFill>
@@ -25809,7 +25943,7 @@
         <p:spPr>
           <a:xfrm>
             <a:off x="4399597" y="3223704"/>
-            <a:ext cx="3669666" cy="2413418"/>
+            <a:ext cx="3669666" cy="2637517"/>
           </a:xfrm>
         </p:spPr>
         <p:txBody>
@@ -25829,7 +25963,43 @@
                   <a:srgbClr val="2F2F2F"/>
                 </a:solidFill>
               </a:rPr>
-              <a:t>Display options include dialog height and width (in % of device screen), which by default are 80% of the height and width of the device screen.</a:t>
+              <a:t>Display options include dialog height and width </a:t>
+            </a:r>
+            <a:r>
+              <a:rPr lang="en-US" b="0" dirty="0">
+                <a:solidFill>
+                  <a:srgbClr val="2F2F2F"/>
+                </a:solidFill>
+                <a:latin typeface="Segoe UI Symbol" panose="020B0502040204020203" pitchFamily="34" charset="0"/>
+                <a:ea typeface="Segoe UI Symbol" panose="020B0502040204020203" pitchFamily="34" charset="0"/>
+              </a:rPr>
+              <a:t>(</a:t>
+            </a:r>
+            <a:r>
+              <a:rPr lang="en-US" b="0" dirty="0">
+                <a:solidFill>
+                  <a:srgbClr val="2F2F2F"/>
+                </a:solidFill>
+              </a:rPr>
+              <a:t>in % of device screen</a:t>
+            </a:r>
+            <a:r>
+              <a:rPr lang="en-US" b="0" dirty="0">
+                <a:solidFill>
+                  <a:srgbClr val="2F2F2F"/>
+                </a:solidFill>
+                <a:latin typeface="Segoe UI Symbol" panose="020B0502040204020203" pitchFamily="34" charset="0"/>
+                <a:ea typeface="Segoe UI Symbol" panose="020B0502040204020203" pitchFamily="34" charset="0"/>
+              </a:rPr>
+              <a:t>)</a:t>
+            </a:r>
+            <a:r>
+              <a:rPr lang="en-US" b="0" dirty="0">
+                <a:solidFill>
+                  <a:srgbClr val="2F2F2F"/>
+                </a:solidFill>
+              </a:rPr>
+              <a:t>, which by default are 80% of the height and width of the device screen.</a:t>
             </a:r>
           </a:p>
           <a:p>
@@ -25847,6 +26017,8 @@
                 <a:solidFill>
                   <a:srgbClr val="2F2F2F"/>
                 </a:solidFill>
+                <a:latin typeface="Courier New" panose="02070309020205020404" pitchFamily="49" charset="0"/>
+                <a:cs typeface="Courier New" panose="02070309020205020404" pitchFamily="49" charset="0"/>
               </a:rPr>
               <a:t>displayInIframe</a:t>
             </a:r>
@@ -25872,7 +26044,43 @@
                   <a:srgbClr val="2F2F2F"/>
                 </a:solidFill>
               </a:rPr>
-              <a:t> rather than an independent window (in clients that support this), which makes it open faster.</a:t>
+              <a:t> rather than an independent window </a:t>
+            </a:r>
+            <a:r>
+              <a:rPr lang="en-US" b="0" dirty="0">
+                <a:solidFill>
+                  <a:srgbClr val="2F2F2F"/>
+                </a:solidFill>
+                <a:latin typeface="Segoe UI Symbol" panose="020B0502040204020203" pitchFamily="34" charset="0"/>
+                <a:ea typeface="Segoe UI Symbol" panose="020B0502040204020203" pitchFamily="34" charset="0"/>
+              </a:rPr>
+              <a:t>(</a:t>
+            </a:r>
+            <a:r>
+              <a:rPr lang="en-US" b="0" dirty="0">
+                <a:solidFill>
+                  <a:srgbClr val="2F2F2F"/>
+                </a:solidFill>
+              </a:rPr>
+              <a:t>in clients that support this</a:t>
+            </a:r>
+            <a:r>
+              <a:rPr lang="en-US" b="0" dirty="0">
+                <a:solidFill>
+                  <a:srgbClr val="2F2F2F"/>
+                </a:solidFill>
+                <a:latin typeface="Segoe UI Symbol" panose="020B0502040204020203" pitchFamily="34" charset="0"/>
+                <a:ea typeface="Segoe UI Symbol" panose="020B0502040204020203" pitchFamily="34" charset="0"/>
+              </a:rPr>
+              <a:t>)</a:t>
+            </a:r>
+            <a:r>
+              <a:rPr lang="en-US" b="0" dirty="0">
+                <a:solidFill>
+                  <a:srgbClr val="2F2F2F"/>
+                </a:solidFill>
+              </a:rPr>
+              <a:t>, which makes it open faster.</a:t>
             </a:r>
             <a:endParaRPr lang="en-US" b="0" dirty="0">
               <a:solidFill>
@@ -25904,7 +26112,7 @@
         <p:spPr>
           <a:xfrm>
             <a:off x="465138" y="3214124"/>
-            <a:ext cx="3690937" cy="1374672"/>
+            <a:ext cx="3690937" cy="1598771"/>
           </a:xfrm>
         </p:spPr>
         <p:txBody>
@@ -25924,7 +26132,43 @@
                   <a:srgbClr val="2F2F2F"/>
                 </a:solidFill>
               </a:rPr>
-              <a:t>The dialog should initially open to a page hosted from an app domain (as defined in manifest).</a:t>
+              <a:t>The dialog should initially open to a page hosted from an app domain </a:t>
+            </a:r>
+            <a:r>
+              <a:rPr lang="en-US" b="0" dirty="0">
+                <a:solidFill>
+                  <a:srgbClr val="2F2F2F"/>
+                </a:solidFill>
+                <a:latin typeface="Segoe UI Symbol" panose="020B0502040204020203" pitchFamily="34" charset="0"/>
+                <a:ea typeface="Segoe UI Symbol" panose="020B0502040204020203" pitchFamily="34" charset="0"/>
+              </a:rPr>
+              <a:t>(</a:t>
+            </a:r>
+            <a:r>
+              <a:rPr lang="en-US" b="0" dirty="0">
+                <a:solidFill>
+                  <a:srgbClr val="2F2F2F"/>
+                </a:solidFill>
+              </a:rPr>
+              <a:t>as defined in manifest</a:t>
+            </a:r>
+            <a:r>
+              <a:rPr lang="en-US" b="0" dirty="0">
+                <a:solidFill>
+                  <a:srgbClr val="2F2F2F"/>
+                </a:solidFill>
+                <a:latin typeface="Segoe UI Symbol" panose="020B0502040204020203" pitchFamily="34" charset="0"/>
+                <a:ea typeface="Segoe UI Symbol" panose="020B0502040204020203" pitchFamily="34" charset="0"/>
+              </a:rPr>
+              <a:t>)</a:t>
+            </a:r>
+            <a:r>
+              <a:rPr lang="en-US" b="0" dirty="0">
+                <a:solidFill>
+                  <a:srgbClr val="2F2F2F"/>
+                </a:solidFill>
+              </a:rPr>
+              <a:t>.</a:t>
             </a:r>
           </a:p>
           <a:p>
@@ -25935,7 +26179,43 @@
                   <a:srgbClr val="2F2F2F"/>
                 </a:solidFill>
               </a:rPr>
-              <a:t>The dialog can display any page that is hosted securely (HTTPS).</a:t>
+              <a:t>The dialog can display any page that is hosted securely </a:t>
+            </a:r>
+            <a:r>
+              <a:rPr lang="en-US" b="0" dirty="0">
+                <a:solidFill>
+                  <a:srgbClr val="2F2F2F"/>
+                </a:solidFill>
+                <a:latin typeface="Segoe UI Symbol" panose="020B0502040204020203" pitchFamily="34" charset="0"/>
+                <a:ea typeface="Segoe UI Symbol" panose="020B0502040204020203" pitchFamily="34" charset="0"/>
+              </a:rPr>
+              <a:t>(</a:t>
+            </a:r>
+            <a:r>
+              <a:rPr lang="en-US" b="0" dirty="0">
+                <a:solidFill>
+                  <a:srgbClr val="2F2F2F"/>
+                </a:solidFill>
+              </a:rPr>
+              <a:t>HTTPS</a:t>
+            </a:r>
+            <a:r>
+              <a:rPr lang="en-US" b="0" dirty="0">
+                <a:solidFill>
+                  <a:srgbClr val="2F2F2F"/>
+                </a:solidFill>
+                <a:latin typeface="Segoe UI Symbol" panose="020B0502040204020203" pitchFamily="34" charset="0"/>
+                <a:ea typeface="Segoe UI Symbol" panose="020B0502040204020203" pitchFamily="34" charset="0"/>
+              </a:rPr>
+              <a:t>)</a:t>
+            </a:r>
+            <a:r>
+              <a:rPr lang="en-US" b="0" dirty="0">
+                <a:solidFill>
+                  <a:srgbClr val="2F2F2F"/>
+                </a:solidFill>
+              </a:rPr>
+              <a:t>.</a:t>
             </a:r>
             <a:endParaRPr lang="en-US" b="0" dirty="0">
               <a:solidFill>
@@ -26079,7 +26359,7 @@
         <p:spPr>
           <a:xfrm>
             <a:off x="465140" y="1915250"/>
-            <a:ext cx="4285718" cy="3330142"/>
+            <a:ext cx="4285718" cy="4216539"/>
           </a:xfrm>
           <a:prstGeom prst="rect">
             <a:avLst/>
@@ -26333,15 +26613,36 @@
             </a:pPr>
             <a:r>
               <a:rPr lang="en-US" sz="1600" dirty="0"/>
-              <a:t>The primary way to pass information to a dialog is through local storage (ex: </a:t>
-            </a:r>
-            <a:r>
-              <a:rPr lang="en-US" sz="1600" dirty="0" err="1"/>
+              <a:t>The primary way to pass information to a dialog is through local storage </a:t>
+            </a:r>
+            <a:r>
+              <a:rPr lang="en-US" sz="1600" dirty="0">
+                <a:latin typeface="Segoe UI Symbol" panose="020B0502040204020203" pitchFamily="34" charset="0"/>
+                <a:ea typeface="Segoe UI Symbol" panose="020B0502040204020203" pitchFamily="34" charset="0"/>
+              </a:rPr>
+              <a:t>(</a:t>
+            </a:r>
+            <a:r>
+              <a:rPr lang="en-US" sz="1600" dirty="0"/>
+              <a:t>ex: </a:t>
+            </a:r>
+            <a:r>
+              <a:rPr lang="en-US" sz="1600" dirty="0" err="1">
+                <a:latin typeface="Courier New" panose="02070309020205020404" pitchFamily="49" charset="0"/>
+                <a:cs typeface="Courier New" panose="02070309020205020404" pitchFamily="49" charset="0"/>
+              </a:rPr>
               <a:t>window.localStorage</a:t>
             </a:r>
             <a:r>
+              <a:rPr lang="en-US" sz="1600" dirty="0">
+                <a:latin typeface="Segoe UI Symbol" panose="020B0502040204020203" pitchFamily="34" charset="0"/>
+                <a:ea typeface="Segoe UI Symbol" panose="020B0502040204020203" pitchFamily="34" charset="0"/>
+              </a:rPr>
+              <a:t>)</a:t>
+            </a:r>
+            <a:r>
               <a:rPr lang="en-US" sz="1600" dirty="0"/>
-              <a:t>) or URL parameters in the dialog URL.</a:t>
+              <a:t> or URL parameters in the dialog URL.</a:t>
             </a:r>
           </a:p>
           <a:p>
@@ -26361,7 +26662,8 @@
             </a:r>
             <a:r>
               <a:rPr lang="en-US" sz="1600" dirty="0" err="1">
-                <a:latin typeface="+mj-lt"/>
+                <a:latin typeface="Courier New" panose="02070309020205020404" pitchFamily="49" charset="0"/>
+                <a:cs typeface="Courier New" panose="02070309020205020404" pitchFamily="49" charset="0"/>
               </a:rPr>
               <a:t>Office.context.ui.messageParent</a:t>
             </a:r>
@@ -26389,7 +26691,8 @@
             </a:r>
             <a:r>
               <a:rPr lang="en-US" sz="1600" dirty="0" err="1">
-                <a:latin typeface="+mj-lt"/>
+                <a:latin typeface="Courier New" panose="02070309020205020404" pitchFamily="49" charset="0"/>
+                <a:cs typeface="Courier New" panose="02070309020205020404" pitchFamily="49" charset="0"/>
               </a:rPr>
               <a:t>messageParent</a:t>
             </a:r>
@@ -26397,7 +26700,33 @@
               <a:rPr lang="en-US" sz="1600" dirty="0">
                 <a:latin typeface="+mj-lt"/>
               </a:rPr>
-              <a:t> function can only be called on a page with the same domain (including protocol and port) as the host page.</a:t>
+              <a:t> function can only be called on a page with the same domain </a:t>
+            </a:r>
+            <a:r>
+              <a:rPr lang="en-US" sz="1600" dirty="0">
+                <a:latin typeface="Segoe UI Symbol" panose="020B0502040204020203" pitchFamily="34" charset="0"/>
+                <a:ea typeface="Segoe UI Symbol" panose="020B0502040204020203" pitchFamily="34" charset="0"/>
+              </a:rPr>
+              <a:t>(</a:t>
+            </a:r>
+            <a:r>
+              <a:rPr lang="en-US" sz="1600" dirty="0">
+                <a:latin typeface="+mj-lt"/>
+              </a:rPr>
+              <a:t>including protocol and port</a:t>
+            </a:r>
+            <a:r>
+              <a:rPr lang="en-US" sz="1600" dirty="0">
+                <a:latin typeface="Segoe UI Symbol" panose="020B0502040204020203" pitchFamily="34" charset="0"/>
+                <a:ea typeface="Segoe UI Symbol" panose="020B0502040204020203" pitchFamily="34" charset="0"/>
+              </a:rPr>
+              <a:t>)</a:t>
+            </a:r>
+            <a:r>
+              <a:rPr lang="en-US" sz="1600" dirty="0">
+                <a:latin typeface="+mj-lt"/>
+              </a:rPr>
+              <a:t> as the host page.</a:t>
             </a:r>
           </a:p>
           <a:p>
@@ -26417,7 +26746,8 @@
             </a:r>
             <a:r>
               <a:rPr lang="en-US" sz="1600" dirty="0" err="1">
-                <a:latin typeface="+mj-lt"/>
+                <a:latin typeface="Courier New" panose="02070309020205020404" pitchFamily="49" charset="0"/>
+                <a:cs typeface="Courier New" panose="02070309020205020404" pitchFamily="49" charset="0"/>
               </a:rPr>
               <a:t>DialogMessageReceived</a:t>
             </a:r>

</xml_diff>